<commit_message>
changes to order plus a few more notes
</commit_message>
<xml_diff>
--- a/2018-10-19-PSConfAsia/Building-Better-Bricks.pptx
+++ b/2018-10-19-PSConfAsia/Building-Better-Bricks.pptx
@@ -16,12 +16,12 @@
     <p:sldId id="279" r:id="rId10"/>
     <p:sldId id="280" r:id="rId11"/>
     <p:sldId id="271" r:id="rId12"/>
-    <p:sldId id="270" r:id="rId13"/>
-    <p:sldId id="281" r:id="rId14"/>
-    <p:sldId id="272" r:id="rId15"/>
-    <p:sldId id="282" r:id="rId16"/>
-    <p:sldId id="283" r:id="rId17"/>
-    <p:sldId id="284" r:id="rId18"/>
+    <p:sldId id="272" r:id="rId13"/>
+    <p:sldId id="282" r:id="rId14"/>
+    <p:sldId id="283" r:id="rId15"/>
+    <p:sldId id="284" r:id="rId16"/>
+    <p:sldId id="270" r:id="rId17"/>
+    <p:sldId id="281" r:id="rId18"/>
     <p:sldId id="264" r:id="rId19"/>
     <p:sldId id="274" r:id="rId20"/>
     <p:sldId id="285" r:id="rId21"/>
@@ -217,7 +217,7 @@
           </a:lstStyle>
           <a:p>
             <a:fld id="{811A311C-DD8B-164B-A5B4-891FB44DF03B}" type="datetimeFigureOut">
-              <a:t>10/6/2018</a:t>
+              <a:t>10/14/2018</a:t>
             </a:fld>
             <a:endParaRPr lang="en-US"/>
           </a:p>
@@ -794,7 +794,7 @@
           <a:p>
             <a:r>
               <a:rPr lang="en-GB" dirty="0"/>
-              <a:t>Platforms like VSTS etc are usually free or cheap (depending on users and where your code sits), they make it much easier to implement this sort of build automation and store your code. The larger tools like VSTS and Gitlab come with even more tools, VSTS in particular also comes with work item management that can be leveraged to let you track the next few features you want to add in your code, or any bugs that have been found. Both platforms give you a range of </a:t>
+              <a:t>Platforms like Azure Pipelines (part of Azure DevOps) etc are usually free or cheap (depending on users and where your code sits), they make it much easier to implement this sort of build automation and store your code. The larger tools like Azure Pipelines and Gitlab come with even more tools, Azure DevOps in particular also comes with work item management that can be leveraged to let you track the next few features you want to add in your code, or any bugs that have been found. Both platforms give you a range of </a:t>
             </a:r>
             <a:r>
               <a:rPr lang="en-GB" dirty="0" err="1"/>
@@ -1722,7 +1722,7 @@
           <a:p>
             <a:r>
               <a:rPr lang="en-GB" dirty="0"/>
-              <a:t>Tests can be broken down into unit, integration or other categories. Personally I have a Unit folder for true unit tests and then later will create an Integration folder for integration testing, all using Pester with Tags to differentiate between the types.</a:t>
+              <a:t>In the example module there are 3700+ lines of code in the psm1. Trying to resolve merge conflicts on that size file gets pretty difficult and just generally reviewing the changes on such a file isn’t easy.</a:t>
             </a:r>
           </a:p>
           <a:p>
@@ -1730,62 +1730,12 @@
           </a:p>
           <a:p>
             <a:r>
+              <a:rPr lang="en-GB" dirty="0" err="1"/>
+              <a:t>PowerShellGet</a:t>
+            </a:r>
+            <a:r>
               <a:rPr lang="en-GB" dirty="0"/>
-              <a:t>Build.depend.ps1 is for </a:t>
-            </a:r>
-            <a:r>
-              <a:rPr lang="en-GB" dirty="0" err="1"/>
-              <a:t>PSDepend</a:t>
-            </a:r>
-            <a:r>
-              <a:rPr lang="en-GB" dirty="0"/>
-              <a:t> and handles any dependencies I have for building the module, like Pester, </a:t>
-            </a:r>
-            <a:r>
-              <a:rPr lang="en-GB" dirty="0" err="1"/>
-              <a:t>PlatyPS</a:t>
-            </a:r>
-            <a:r>
-              <a:rPr lang="en-GB" dirty="0"/>
-              <a:t> and more. In some other modules I have it download some of those dependencies to the Output folder so that I can ship them with the module for systems that don’t have Internet access.</a:t>
-            </a:r>
-          </a:p>
-          <a:p>
-            <a:endParaRPr lang="en-GB" dirty="0"/>
-          </a:p>
-          <a:p>
-            <a:r>
-              <a:rPr lang="en-GB" dirty="0"/>
-              <a:t>LICENSE isn’t really necessary for modules that will only be used internally but for public projects please include one, ideally MIT or another very open license.</a:t>
-            </a:r>
-          </a:p>
-          <a:p>
-            <a:endParaRPr lang="en-GB" dirty="0"/>
-          </a:p>
-          <a:p>
-            <a:endParaRPr lang="en-GB" dirty="0"/>
-          </a:p>
-          <a:p>
-            <a:r>
-              <a:rPr lang="en-GB" dirty="0"/>
-              <a:t>Other optional files include </a:t>
-            </a:r>
-            <a:r>
-              <a:rPr lang="en-GB" dirty="0" err="1"/>
-              <a:t>appveyor.yml</a:t>
-            </a:r>
-            <a:r>
-              <a:rPr lang="en-GB" dirty="0"/>
-              <a:t> or similar task runner files. </a:t>
-            </a:r>
-          </a:p>
-          <a:p>
-            <a:endParaRPr lang="en-GB" dirty="0"/>
-          </a:p>
-          <a:p>
-            <a:r>
-              <a:rPr lang="en-GB" dirty="0"/>
-              <a:t>Contributing, code of conduct and similar helpful docs for anyone coming along to work on this. These are more needed for open source but a guide to contributing, either in a dedicated file or in the readme, would be very useful regardless of where the module is stored or used.</a:t>
+              <a:t> was original 16k lines in a single file.</a:t>
             </a:r>
           </a:p>
           <a:p>
@@ -1819,7 +1769,7 @@
     </p:spTree>
     <p:extLst>
       <p:ext uri="{BB962C8B-B14F-4D97-AF65-F5344CB8AC3E}">
-        <p14:creationId xmlns:p14="http://schemas.microsoft.com/office/powerpoint/2010/main" val="4214969562"/>
+        <p14:creationId xmlns:p14="http://schemas.microsoft.com/office/powerpoint/2010/main" val="2562118958"/>
       </p:ext>
     </p:extLst>
   </p:cSld>
@@ -1875,7 +1825,7 @@
           <a:p>
             <a:r>
               <a:rPr lang="en-GB" dirty="0"/>
-              <a:t>In the example module there are 3700+ lines of code in the psm1. Trying to resolve merge conflicts on that size file gets pretty difficult and just generally reviewing the changes on such a file isn’t easy.</a:t>
+              <a:t>When doing code signing you have to sign every single file in the module, the numbers shown here don’t include that but get considerably worse when you have to check the signing on every single file.</a:t>
             </a:r>
           </a:p>
           <a:p>
@@ -1888,8 +1838,21 @@
             </a:r>
             <a:r>
               <a:rPr lang="en-GB" dirty="0"/>
-              <a:t> was original 16k lines in a single file.</a:t>
-            </a:r>
+              <a:t> had a dot sourced version after someone refactored the code and the load time was 12s</a:t>
+            </a:r>
+          </a:p>
+          <a:p>
+            <a:r>
+              <a:rPr lang="en-GB" dirty="0" err="1"/>
+              <a:t>DbaTools</a:t>
+            </a:r>
+            <a:r>
+              <a:rPr lang="en-GB" dirty="0"/>
+              <a:t> has a dot sourced version for dev users, with it’s 506 public commands, loads in 17s (previously I’d seen it load in 40s on the same machine)</a:t>
+            </a:r>
+          </a:p>
+          <a:p>
+            <a:endParaRPr lang="en-GB" dirty="0"/>
           </a:p>
           <a:p>
             <a:endParaRPr lang="en-GB" dirty="0"/>
@@ -1913,7 +1876,7 @@
           <a:p>
             <a:fld id="{1184D872-AB72-7141-BB7A-B591141434CC}" type="slidenum">
               <a:rPr lang="en-GB" smtClean="0"/>
-              <a:t>12</a:t>
+              <a:t>11</a:t>
             </a:fld>
             <a:endParaRPr lang="en-GB"/>
           </a:p>
@@ -1922,7 +1885,7 @@
     </p:spTree>
     <p:extLst>
       <p:ext uri="{BB962C8B-B14F-4D97-AF65-F5344CB8AC3E}">
-        <p14:creationId xmlns:p14="http://schemas.microsoft.com/office/powerpoint/2010/main" val="2562118958"/>
+        <p14:creationId xmlns:p14="http://schemas.microsoft.com/office/powerpoint/2010/main" val="3314730644"/>
       </p:ext>
     </p:extLst>
   </p:cSld>
@@ -1978,7 +1941,7 @@
           <a:p>
             <a:r>
               <a:rPr lang="en-GB" dirty="0"/>
-              <a:t>When doing code signing you have to sign every single file in the module, the numbers shown here don’t include that but get considerably worse when you have to check the signing on every single file.</a:t>
+              <a:t>You should only ship the pd1 and psm1.</a:t>
             </a:r>
           </a:p>
           <a:p>
@@ -1991,7 +1954,7 @@
             </a:r>
             <a:r>
               <a:rPr lang="en-GB" dirty="0"/>
-              <a:t> had a dot sourced version after someone refactored the code and the load time was 12s</a:t>
+              <a:t> moved to compiling their module again and dropped the load time down to about 2s</a:t>
             </a:r>
           </a:p>
           <a:p>
@@ -2001,11 +1964,8 @@
             </a:r>
             <a:r>
               <a:rPr lang="en-GB" dirty="0"/>
-              <a:t> has a dot sourced version for dev users, with it’s 506 public commands, loads in 17s (previously I’d seen it load in 40s on the same machine)</a:t>
-            </a:r>
-          </a:p>
-          <a:p>
-            <a:endParaRPr lang="en-GB" dirty="0"/>
+              <a:t> public version is a compiled psm1 and load time is dropped to about 6s</a:t>
+            </a:r>
           </a:p>
           <a:p>
             <a:endParaRPr lang="en-GB" dirty="0"/>
@@ -2029,7 +1989,7 @@
           <a:p>
             <a:fld id="{1184D872-AB72-7141-BB7A-B591141434CC}" type="slidenum">
               <a:rPr lang="en-GB" smtClean="0"/>
-              <a:t>13</a:t>
+              <a:t>12</a:t>
             </a:fld>
             <a:endParaRPr lang="en-GB"/>
           </a:p>
@@ -2038,7 +1998,7 @@
     </p:spTree>
     <p:extLst>
       <p:ext uri="{BB962C8B-B14F-4D97-AF65-F5344CB8AC3E}">
-        <p14:creationId xmlns:p14="http://schemas.microsoft.com/office/powerpoint/2010/main" val="3314730644"/>
+        <p14:creationId xmlns:p14="http://schemas.microsoft.com/office/powerpoint/2010/main" val="1913976773"/>
       </p:ext>
     </p:extLst>
   </p:cSld>
@@ -2094,7 +2054,7 @@
           <a:p>
             <a:r>
               <a:rPr lang="en-GB" dirty="0"/>
-              <a:t>You should only ship the pd1 and psm1.</a:t>
+              <a:t>If you’ve got PowerShell classes then they can go into a Classes folder under source. There are some difficulties with ensuring they load in the correct order if you’ve got classes depending on each other, there aren’t any good solutions to this yet beyond naming them 01.Class.ps1, 02.Class.ps1</a:t>
             </a:r>
           </a:p>
           <a:p>
@@ -2102,22 +2062,71 @@
           </a:p>
           <a:p>
             <a:r>
+              <a:rPr lang="en-GB" dirty="0"/>
+              <a:t>Tests can be broken down into unit, integration or other categories. Personally I have a Unit folder for true unit tests and then later will create an Integration folder for integration testing, all using Pester with Tags to differentiate between the types.</a:t>
+            </a:r>
+          </a:p>
+          <a:p>
+            <a:endParaRPr lang="en-GB" dirty="0"/>
+          </a:p>
+          <a:p>
+            <a:r>
+              <a:rPr lang="en-GB" dirty="0"/>
+              <a:t>Build.depend.ps1 is for </a:t>
+            </a:r>
+            <a:r>
               <a:rPr lang="en-GB" dirty="0" err="1"/>
-              <a:t>PowerShellGet</a:t>
+              <a:t>PSDepend</a:t>
             </a:r>
             <a:r>
               <a:rPr lang="en-GB" dirty="0"/>
-              <a:t> moved to compiling their module again and dropped the load time down to about 2s</a:t>
-            </a:r>
-          </a:p>
-          <a:p>
+              <a:t> and handles any dependencies I have for building the module, like Pester, </a:t>
+            </a:r>
             <a:r>
               <a:rPr lang="en-GB" dirty="0" err="1"/>
-              <a:t>DbaTools</a:t>
+              <a:t>PlatyPS</a:t>
             </a:r>
             <a:r>
               <a:rPr lang="en-GB" dirty="0"/>
-              <a:t> public version is a compiled psm1 and load time is dropped to about 6s</a:t>
+              <a:t> and more. In some other modules I have it download some of those dependencies to the Output folder so that I can ship them with the module for systems that don’t have Internet access.</a:t>
+            </a:r>
+          </a:p>
+          <a:p>
+            <a:endParaRPr lang="en-GB" dirty="0"/>
+          </a:p>
+          <a:p>
+            <a:r>
+              <a:rPr lang="en-GB" dirty="0"/>
+              <a:t>LICENSE isn’t really necessary for modules that will only be used internally but for public projects please include one, ideally MIT or another very open license.</a:t>
+            </a:r>
+          </a:p>
+          <a:p>
+            <a:endParaRPr lang="en-GB" dirty="0"/>
+          </a:p>
+          <a:p>
+            <a:endParaRPr lang="en-GB" dirty="0"/>
+          </a:p>
+          <a:p>
+            <a:r>
+              <a:rPr lang="en-GB" dirty="0"/>
+              <a:t>Other optional files include </a:t>
+            </a:r>
+            <a:r>
+              <a:rPr lang="en-GB" dirty="0" err="1"/>
+              <a:t>appveyor.yml</a:t>
+            </a:r>
+            <a:r>
+              <a:rPr lang="en-GB" dirty="0"/>
+              <a:t> or similar task runner files. </a:t>
+            </a:r>
+          </a:p>
+          <a:p>
+            <a:endParaRPr lang="en-GB" dirty="0"/>
+          </a:p>
+          <a:p>
+            <a:r>
+              <a:rPr lang="en-GB" dirty="0"/>
+              <a:t>Contributing, code of conduct and similar helpful docs for anyone coming along to work on this. These are more needed for open source but a guide to contributing, either in a dedicated file or in the readme, would be very useful regardless of where the module is stored or used.</a:t>
             </a:r>
           </a:p>
           <a:p>
@@ -2151,7 +2160,7 @@
     </p:spTree>
     <p:extLst>
       <p:ext uri="{BB962C8B-B14F-4D97-AF65-F5344CB8AC3E}">
-        <p14:creationId xmlns:p14="http://schemas.microsoft.com/office/powerpoint/2010/main" val="1913976773"/>
+        <p14:creationId xmlns:p14="http://schemas.microsoft.com/office/powerpoint/2010/main" val="4214969562"/>
       </p:ext>
     </p:extLst>
   </p:cSld>
@@ -2290,7 +2299,7 @@
           <a:p>
             <a:fld id="{99585AEA-614B-7045-B3D9-61FEC86204D9}" type="datetimeFigureOut">
               <a:rPr lang="en-US" smtClean="0"/>
-              <a:t>10/6/2018</a:t>
+              <a:t>10/14/2018</a:t>
             </a:fld>
             <a:endParaRPr lang="en-US"/>
           </a:p>
@@ -2458,7 +2467,7 @@
           <a:p>
             <a:fld id="{99585AEA-614B-7045-B3D9-61FEC86204D9}" type="datetimeFigureOut">
               <a:rPr lang="en-US" smtClean="0"/>
-              <a:t>10/6/2018</a:t>
+              <a:t>10/14/2018</a:t>
             </a:fld>
             <a:endParaRPr lang="en-US"/>
           </a:p>
@@ -2636,7 +2645,7 @@
           <a:p>
             <a:fld id="{99585AEA-614B-7045-B3D9-61FEC86204D9}" type="datetimeFigureOut">
               <a:rPr lang="en-US" smtClean="0"/>
-              <a:t>10/6/2018</a:t>
+              <a:t>10/14/2018</a:t>
             </a:fld>
             <a:endParaRPr lang="en-US"/>
           </a:p>
@@ -2804,7 +2813,7 @@
           <a:p>
             <a:fld id="{99585AEA-614B-7045-B3D9-61FEC86204D9}" type="datetimeFigureOut">
               <a:rPr lang="en-US" smtClean="0"/>
-              <a:t>10/6/2018</a:t>
+              <a:t>10/14/2018</a:t>
             </a:fld>
             <a:endParaRPr lang="en-US"/>
           </a:p>
@@ -3049,7 +3058,7 @@
           <a:p>
             <a:fld id="{99585AEA-614B-7045-B3D9-61FEC86204D9}" type="datetimeFigureOut">
               <a:rPr lang="en-US" smtClean="0"/>
-              <a:t>10/6/2018</a:t>
+              <a:t>10/14/2018</a:t>
             </a:fld>
             <a:endParaRPr lang="en-US"/>
           </a:p>
@@ -3278,7 +3287,7 @@
           <a:p>
             <a:fld id="{99585AEA-614B-7045-B3D9-61FEC86204D9}" type="datetimeFigureOut">
               <a:rPr lang="en-US" smtClean="0"/>
-              <a:t>10/6/2018</a:t>
+              <a:t>10/14/2018</a:t>
             </a:fld>
             <a:endParaRPr lang="en-US"/>
           </a:p>
@@ -3642,7 +3651,7 @@
           <a:p>
             <a:fld id="{99585AEA-614B-7045-B3D9-61FEC86204D9}" type="datetimeFigureOut">
               <a:rPr lang="en-US" smtClean="0"/>
-              <a:t>10/6/2018</a:t>
+              <a:t>10/14/2018</a:t>
             </a:fld>
             <a:endParaRPr lang="en-US"/>
           </a:p>
@@ -3759,7 +3768,7 @@
           <a:p>
             <a:fld id="{99585AEA-614B-7045-B3D9-61FEC86204D9}" type="datetimeFigureOut">
               <a:rPr lang="en-US" smtClean="0"/>
-              <a:t>10/6/2018</a:t>
+              <a:t>10/14/2018</a:t>
             </a:fld>
             <a:endParaRPr lang="en-US"/>
           </a:p>
@@ -3854,7 +3863,7 @@
           <a:p>
             <a:fld id="{99585AEA-614B-7045-B3D9-61FEC86204D9}" type="datetimeFigureOut">
               <a:rPr lang="en-US" smtClean="0"/>
-              <a:t>10/6/2018</a:t>
+              <a:t>10/14/2018</a:t>
             </a:fld>
             <a:endParaRPr lang="en-US"/>
           </a:p>
@@ -4129,7 +4138,7 @@
           <a:p>
             <a:fld id="{99585AEA-614B-7045-B3D9-61FEC86204D9}" type="datetimeFigureOut">
               <a:rPr lang="en-US" smtClean="0"/>
-              <a:t>10/6/2018</a:t>
+              <a:t>10/14/2018</a:t>
             </a:fld>
             <a:endParaRPr lang="en-US"/>
           </a:p>
@@ -4381,7 +4390,7 @@
           <a:p>
             <a:fld id="{99585AEA-614B-7045-B3D9-61FEC86204D9}" type="datetimeFigureOut">
               <a:rPr lang="en-US" smtClean="0"/>
-              <a:t>10/6/2018</a:t>
+              <a:t>10/14/2018</a:t>
             </a:fld>
             <a:endParaRPr lang="en-US"/>
           </a:p>
@@ -4592,7 +4601,7 @@
           <a:p>
             <a:fld id="{99585AEA-614B-7045-B3D9-61FEC86204D9}" type="datetimeFigureOut">
               <a:rPr lang="en-US" smtClean="0"/>
-              <a:t>10/6/2018</a:t>
+              <a:t>10/14/2018</a:t>
             </a:fld>
             <a:endParaRPr lang="en-US"/>
           </a:p>
@@ -5688,7 +5697,7 @@
           <p:cNvPr id="10" name="Title 1">
             <a:extLst>
               <a:ext uri="{FF2B5EF4-FFF2-40B4-BE49-F238E27FC236}">
-                <a16:creationId xmlns:a16="http://schemas.microsoft.com/office/drawing/2014/main" id="{BD02FBB2-FAAA-4089-B255-BD4C2BA6A407}"/>
+                <a16:creationId xmlns:a16="http://schemas.microsoft.com/office/drawing/2014/main" id="{0D5E4B60-CE22-4450-BF21-83243473770F}"/>
               </a:ext>
             </a:extLst>
           </p:cNvPr>
@@ -5711,7 +5720,7 @@
           <a:p>
             <a:r>
               <a:rPr lang="en-GB" dirty="0"/>
-              <a:t>Folder Structure</a:t>
+              <a:t>Module Structure – Big psm1</a:t>
             </a:r>
           </a:p>
         </p:txBody>
@@ -5721,7 +5730,7 @@
           <p:cNvPr id="11" name="Content Placeholder 2">
             <a:extLst>
               <a:ext uri="{FF2B5EF4-FFF2-40B4-BE49-F238E27FC236}">
-                <a16:creationId xmlns:a16="http://schemas.microsoft.com/office/drawing/2014/main" id="{C3B00FC6-EED0-4F1D-BAC0-191B71392355}"/>
+                <a16:creationId xmlns:a16="http://schemas.microsoft.com/office/drawing/2014/main" id="{6553DA11-320E-47B4-92C1-597411F32BEE}"/>
               </a:ext>
             </a:extLst>
           </p:cNvPr>
@@ -5735,7 +5744,7 @@
         <p:spPr>
           <a:xfrm>
             <a:off x="838200" y="1825625"/>
-            <a:ext cx="8318241" cy="4351338"/>
+            <a:ext cx="10515600" cy="4351338"/>
           </a:xfrm>
         </p:spPr>
         <p:txBody>
@@ -5744,25 +5753,41 @@
           <a:p>
             <a:r>
               <a:rPr lang="en-GB" dirty="0"/>
-              <a:t>Git Ignore file set to ignore the output directory</a:t>
-            </a:r>
-          </a:p>
-          <a:p>
-            <a:endParaRPr lang="en-GB" dirty="0"/>
-          </a:p>
-          <a:p>
+              <a:t>Pros</a:t>
+            </a:r>
+          </a:p>
+          <a:p>
+            <a:pPr lvl="1"/>
             <a:r>
               <a:rPr lang="en-GB" dirty="0"/>
-              <a:t>VS Code folder to enforce some coding styles and use build script for debugging</a:t>
-            </a:r>
-          </a:p>
-          <a:p>
-            <a:endParaRPr lang="en-GB" dirty="0"/>
-          </a:p>
-          <a:p>
+              <a:t>Quick to load</a:t>
+            </a:r>
+          </a:p>
+          <a:p>
+            <a:pPr lvl="1"/>
             <a:r>
               <a:rPr lang="en-GB" dirty="0"/>
-              <a:t>Source split into public and private folders with 1 function per ps1 file.</a:t>
+              <a:t>Easy to distribute</a:t>
+            </a:r>
+          </a:p>
+          <a:p>
+            <a:r>
+              <a:rPr lang="en-GB" dirty="0"/>
+              <a:t>Cons</a:t>
+            </a:r>
+          </a:p>
+          <a:p>
+            <a:pPr lvl="1"/>
+            <a:r>
+              <a:rPr lang="en-GB" dirty="0"/>
+              <a:t>Difficult to maintain</a:t>
+            </a:r>
+          </a:p>
+          <a:p>
+            <a:pPr lvl="1"/>
+            <a:r>
+              <a:rPr lang="en-GB" dirty="0"/>
+              <a:t>Can become very long</a:t>
             </a:r>
           </a:p>
         </p:txBody>
@@ -5772,7 +5797,7 @@
           <p:cNvPr id="12" name="Picture 11">
             <a:extLst>
               <a:ext uri="{FF2B5EF4-FFF2-40B4-BE49-F238E27FC236}">
-                <a16:creationId xmlns:a16="http://schemas.microsoft.com/office/drawing/2014/main" id="{1E938204-30CD-4E29-9434-F7C4336272E1}"/>
+                <a16:creationId xmlns:a16="http://schemas.microsoft.com/office/drawing/2014/main" id="{99BAF1DF-904C-427E-BF9D-01E5EFF050E6}"/>
               </a:ext>
             </a:extLst>
           </p:cNvPr>
@@ -5781,16 +5806,45 @@
           </p:cNvPicPr>
           <p:nvPr/>
         </p:nvPicPr>
+        <p:blipFill rotWithShape="1">
+          <a:blip r:embed="rId5"/>
+          <a:srcRect t="14199" r="61969"/>
+          <a:stretch/>
+        </p:blipFill>
+        <p:spPr>
+          <a:xfrm>
+            <a:off x="7999563" y="4344658"/>
+            <a:ext cx="4065917" cy="2148217"/>
+          </a:xfrm>
+          <a:prstGeom prst="rect">
+            <a:avLst/>
+          </a:prstGeom>
+        </p:spPr>
+      </p:pic>
+      <p:pic>
+        <p:nvPicPr>
+          <p:cNvPr id="13" name="Picture 12">
+            <a:extLst>
+              <a:ext uri="{FF2B5EF4-FFF2-40B4-BE49-F238E27FC236}">
+                <a16:creationId xmlns:a16="http://schemas.microsoft.com/office/drawing/2014/main" id="{3A81E3AF-B67D-4FBD-9D0A-29CF7F5C7456}"/>
+              </a:ext>
+            </a:extLst>
+          </p:cNvPr>
+          <p:cNvPicPr>
+            <a:picLocks noChangeAspect="1"/>
+          </p:cNvPicPr>
+          <p:nvPr/>
+        </p:nvPicPr>
         <p:blipFill>
-          <a:blip r:embed="rId5"/>
+          <a:blip r:embed="rId6"/>
           <a:stretch>
             <a:fillRect/>
           </a:stretch>
         </p:blipFill>
         <p:spPr>
           <a:xfrm>
-            <a:off x="9337799" y="832595"/>
-            <a:ext cx="2559606" cy="5192810"/>
+            <a:off x="8451515" y="1412889"/>
+            <a:ext cx="2902285" cy="2512255"/>
           </a:xfrm>
           <a:prstGeom prst="rect">
             <a:avLst/>
@@ -5800,7 +5854,7 @@
     </p:spTree>
     <p:extLst>
       <p:ext uri="{BB962C8B-B14F-4D97-AF65-F5344CB8AC3E}">
-        <p14:creationId xmlns:p14="http://schemas.microsoft.com/office/powerpoint/2010/main" val="4108849427"/>
+        <p14:creationId xmlns:p14="http://schemas.microsoft.com/office/powerpoint/2010/main" val="2784518710"/>
       </p:ext>
     </p:extLst>
   </p:cSld>
@@ -5829,27 +5883,45 @@
       </p:grpSpPr>
       <p:pic>
         <p:nvPicPr>
-          <p:cNvPr id="4" name="Picture 3"/>
+          <p:cNvPr id="6" name="Picture 5"/>
           <p:cNvPicPr>
             <a:picLocks noChangeAspect="1"/>
           </p:cNvPicPr>
           <p:nvPr/>
         </p:nvPicPr>
-        <p:blipFill rotWithShape="1">
-          <a:blip r:embed="rId2">
+        <p:blipFill>
+          <a:blip r:embed="rId3">
+            <a:clrChange>
+              <a:clrFrom>
+                <a:srgbClr val="FFFFFF"/>
+              </a:clrFrom>
+              <a:clrTo>
+                <a:srgbClr val="FFFFFF">
+                  <a:alpha val="0"/>
+                </a:srgbClr>
+              </a:clrTo>
+            </a:clrChange>
+            <a:duotone>
+              <a:schemeClr val="accent3">
+                <a:shade val="45000"/>
+                <a:satMod val="135000"/>
+              </a:schemeClr>
+              <a:prstClr val="white"/>
+            </a:duotone>
             <a:extLst>
               <a:ext uri="{28A0092B-C50C-407E-A947-70E740481C1C}">
                 <a14:useLocalDpi xmlns:a14="http://schemas.microsoft.com/office/drawing/2010/main" val="0"/>
               </a:ext>
             </a:extLst>
           </a:blip>
-          <a:srcRect t="3338" b="26176"/>
-          <a:stretch/>
+          <a:stretch>
+            <a:fillRect/>
+          </a:stretch>
         </p:blipFill>
         <p:spPr>
           <a:xfrm>
-            <a:off x="-1" y="-1"/>
-            <a:ext cx="12192001" cy="5731934"/>
+            <a:off x="0" y="5757143"/>
+            <a:ext cx="1153398" cy="1100857"/>
           </a:xfrm>
           <a:prstGeom prst="rect">
             <a:avLst/>
@@ -5858,14 +5930,14 @@
       </p:pic>
       <p:sp>
         <p:nvSpPr>
-          <p:cNvPr id="15" name="Rectangle 14"/>
+          <p:cNvPr id="7" name="Rectangle 6"/>
           <p:cNvSpPr/>
           <p:nvPr/>
         </p:nvSpPr>
         <p:spPr>
           <a:xfrm>
-            <a:off x="0" y="0"/>
-            <a:ext cx="4419238" cy="584775"/>
+            <a:off x="986715" y="5999793"/>
+            <a:ext cx="1888814" cy="307777"/>
           </a:xfrm>
           <a:prstGeom prst="rect">
             <a:avLst/>
@@ -5879,46 +5951,71 @@
           <a:lstStyle/>
           <a:p>
             <a:r>
-              <a:rPr lang="en-US" sz="2800" b="1" dirty="0">
+              <a:rPr lang="en-US" sz="1400" b="1" dirty="0">
                 <a:ln w="10160">
-                  <a:noFill/>
+                  <a:solidFill>
+                    <a:schemeClr val="tx2">
+                      <a:lumMod val="40000"/>
+                      <a:lumOff val="60000"/>
+                    </a:schemeClr>
+                  </a:solidFill>
                   <a:prstDash val="solid"/>
                 </a:ln>
                 <a:solidFill>
-                  <a:srgbClr val="FFFFFF"/>
+                  <a:schemeClr val="bg1">
+                    <a:lumMod val="75000"/>
+                  </a:schemeClr>
                 </a:solidFill>
-                <a:effectLst>
-                  <a:outerShdw blurRad="38100" dist="22860" dir="5400000" algn="tl" rotWithShape="0">
-                    <a:srgbClr val="000000">
-                      <a:alpha val="30000"/>
-                    </a:srgbClr>
-                  </a:outerShdw>
-                </a:effectLst>
                 <a:ea typeface="Kailasa" charset="0"/>
                 <a:cs typeface="Kailasa" charset="0"/>
               </a:rPr>
               <a:t>PowerShell Conference </a:t>
             </a:r>
-            <a:r>
-              <a:rPr lang="en-US" sz="3200" b="1" dirty="0">
+          </a:p>
+        </p:txBody>
+      </p:sp>
+      <p:sp>
+        <p:nvSpPr>
+          <p:cNvPr id="8" name="Rectangle 7"/>
+          <p:cNvSpPr/>
+          <p:nvPr/>
+        </p:nvSpPr>
+        <p:spPr>
+          <a:xfrm>
+            <a:off x="1097837" y="6275007"/>
+            <a:ext cx="1888814" cy="307777"/>
+          </a:xfrm>
+          <a:prstGeom prst="rect">
+            <a:avLst/>
+          </a:prstGeom>
+          <a:noFill/>
+        </p:spPr>
+        <p:txBody>
+          <a:bodyPr wrap="square" lIns="91440" tIns="45720" rIns="91440" bIns="45720">
+            <a:spAutoFit/>
+          </a:bodyPr>
+          <a:lstStyle/>
+          <a:p>
+            <a:r>
+              <a:rPr lang="en-US" sz="1400" b="1" dirty="0">
                 <a:ln w="10160">
-                  <a:noFill/>
+                  <a:solidFill>
+                    <a:schemeClr val="tx2">
+                      <a:lumMod val="40000"/>
+                      <a:lumOff val="60000"/>
+                    </a:schemeClr>
+                  </a:solidFill>
                   <a:prstDash val="solid"/>
                 </a:ln>
                 <a:solidFill>
-                  <a:srgbClr val="FFFFFF"/>
+                  <a:schemeClr val="bg1">
+                    <a:lumMod val="75000"/>
+                  </a:schemeClr>
                 </a:solidFill>
-                <a:effectLst>
-                  <a:outerShdw blurRad="38100" dist="22860" dir="5400000" algn="tl" rotWithShape="0">
-                    <a:srgbClr val="000000">
-                      <a:alpha val="30000"/>
-                    </a:srgbClr>
-                  </a:outerShdw>
-                </a:effectLst>
                 <a:ea typeface="Kailasa" charset="0"/>
                 <a:cs typeface="Kailasa" charset="0"/>
               </a:rPr>
-              <a:t>Asia</a:t>
+              <a:t>Singapore 2018</a:t>
             </a:r>
           </a:p>
         </p:txBody>
@@ -5932,7 +6029,7 @@
           <p:nvPr/>
         </p:nvPicPr>
         <p:blipFill rotWithShape="1">
-          <a:blip r:embed="rId3">
+          <a:blip r:embed="rId4">
             <a:clrChange>
               <a:clrFrom>
                 <a:srgbClr val="FFFFFF"/>
@@ -5962,7 +6059,7 @@
         </p:blipFill>
         <p:spPr>
           <a:xfrm>
-            <a:off x="7075257" y="14288"/>
+            <a:off x="7109334" y="-139058"/>
             <a:ext cx="5088167" cy="5088939"/>
           </a:xfrm>
           <a:prstGeom prst="rect">
@@ -5970,12 +6067,126 @@
           </a:prstGeom>
         </p:spPr>
       </p:pic>
+      <p:sp>
+        <p:nvSpPr>
+          <p:cNvPr id="10" name="Title 1">
+            <a:extLst>
+              <a:ext uri="{FF2B5EF4-FFF2-40B4-BE49-F238E27FC236}">
+                <a16:creationId xmlns:a16="http://schemas.microsoft.com/office/drawing/2014/main" id="{728C0C8E-8AF5-4107-B828-9EF3741D0928}"/>
+              </a:ext>
+            </a:extLst>
+          </p:cNvPr>
+          <p:cNvSpPr>
+            <a:spLocks noGrp="1"/>
+          </p:cNvSpPr>
+          <p:nvPr>
+            <p:ph type="title"/>
+          </p:nvPr>
+        </p:nvSpPr>
+        <p:spPr>
+          <a:xfrm>
+            <a:off x="838200" y="365125"/>
+            <a:ext cx="10515600" cy="1325563"/>
+          </a:xfrm>
+        </p:spPr>
+        <p:txBody>
+          <a:bodyPr/>
+          <a:lstStyle/>
+          <a:p>
+            <a:r>
+              <a:rPr lang="en-GB" dirty="0"/>
+              <a:t>Module Structure – Dot sourced ps1</a:t>
+            </a:r>
+          </a:p>
+        </p:txBody>
+      </p:sp>
+      <p:sp>
+        <p:nvSpPr>
+          <p:cNvPr id="11" name="Content Placeholder 2">
+            <a:extLst>
+              <a:ext uri="{FF2B5EF4-FFF2-40B4-BE49-F238E27FC236}">
+                <a16:creationId xmlns:a16="http://schemas.microsoft.com/office/drawing/2014/main" id="{4B41BCAB-6D98-4821-8A2F-894AC5EDF4AB}"/>
+              </a:ext>
+            </a:extLst>
+          </p:cNvPr>
+          <p:cNvSpPr>
+            <a:spLocks noGrp="1"/>
+          </p:cNvSpPr>
+          <p:nvPr>
+            <p:ph idx="1"/>
+          </p:nvPr>
+        </p:nvSpPr>
+        <p:spPr>
+          <a:xfrm>
+            <a:off x="838200" y="1825625"/>
+            <a:ext cx="10515600" cy="4351338"/>
+          </a:xfrm>
+        </p:spPr>
+        <p:txBody>
+          <a:bodyPr/>
+          <a:lstStyle/>
+          <a:p>
+            <a:r>
+              <a:rPr lang="en-GB" dirty="0"/>
+              <a:t>Pros</a:t>
+            </a:r>
+          </a:p>
+          <a:p>
+            <a:pPr lvl="1"/>
+            <a:r>
+              <a:rPr lang="en-GB" dirty="0"/>
+              <a:t>Easy to maintain</a:t>
+            </a:r>
+          </a:p>
+          <a:p>
+            <a:pPr lvl="1"/>
+            <a:r>
+              <a:rPr lang="en-GB" dirty="0"/>
+              <a:t>Short PSM1</a:t>
+            </a:r>
+          </a:p>
+          <a:p>
+            <a:pPr lvl="1"/>
+            <a:r>
+              <a:rPr lang="en-GB" dirty="0"/>
+              <a:t>Easy to add more functions</a:t>
+            </a:r>
+          </a:p>
+          <a:p>
+            <a:r>
+              <a:rPr lang="en-GB" dirty="0"/>
+              <a:t>Cons</a:t>
+            </a:r>
+          </a:p>
+          <a:p>
+            <a:pPr lvl="1"/>
+            <a:r>
+              <a:rPr lang="en-GB" dirty="0"/>
+              <a:t>Slow to load</a:t>
+            </a:r>
+          </a:p>
+          <a:p>
+            <a:pPr lvl="1"/>
+            <a:r>
+              <a:rPr lang="en-GB" dirty="0"/>
+              <a:t>Potential security issues</a:t>
+            </a:r>
+          </a:p>
+          <a:p>
+            <a:pPr lvl="1"/>
+            <a:r>
+              <a:rPr lang="en-GB" dirty="0"/>
+              <a:t>Slow command discovery</a:t>
+            </a:r>
+          </a:p>
+        </p:txBody>
+      </p:sp>
       <p:pic>
         <p:nvPicPr>
-          <p:cNvPr id="16" name="Picture 15">
+          <p:cNvPr id="12" name="Picture 11">
             <a:extLst>
               <a:ext uri="{FF2B5EF4-FFF2-40B4-BE49-F238E27FC236}">
-                <a16:creationId xmlns:a16="http://schemas.microsoft.com/office/drawing/2014/main" id="{B6DA533B-3B86-714A-9875-96A55A5B60C1}"/>
+                <a16:creationId xmlns:a16="http://schemas.microsoft.com/office/drawing/2014/main" id="{4A5C87EB-C767-44CF-995C-36F91688DFE1}"/>
               </a:ext>
             </a:extLst>
           </p:cNvPr>
@@ -5984,22 +6195,15 @@
           </p:cNvPicPr>
           <p:nvPr/>
         </p:nvPicPr>
-        <p:blipFill>
-          <a:blip r:embed="rId4">
-            <a:extLst>
-              <a:ext uri="{28A0092B-C50C-407E-A947-70E740481C1C}">
-                <a14:useLocalDpi xmlns:a14="http://schemas.microsoft.com/office/drawing/2010/main" val="0"/>
-              </a:ext>
-            </a:extLst>
-          </a:blip>
-          <a:stretch>
-            <a:fillRect/>
-          </a:stretch>
+        <p:blipFill rotWithShape="1">
+          <a:blip r:embed="rId5"/>
+          <a:srcRect t="16934" r="62825"/>
+          <a:stretch/>
         </p:blipFill>
         <p:spPr>
           <a:xfrm>
-            <a:off x="201758" y="5805135"/>
-            <a:ext cx="614818" cy="964420"/>
+            <a:off x="8209472" y="4537104"/>
+            <a:ext cx="3867510" cy="1955771"/>
           </a:xfrm>
           <a:prstGeom prst="rect">
             <a:avLst/>
@@ -6008,40 +6212,10 @@
       </p:pic>
       <p:pic>
         <p:nvPicPr>
-          <p:cNvPr id="17" name="Picture 16">
+          <p:cNvPr id="13" name="Picture 12">
             <a:extLst>
               <a:ext uri="{FF2B5EF4-FFF2-40B4-BE49-F238E27FC236}">
-                <a16:creationId xmlns:a16="http://schemas.microsoft.com/office/drawing/2014/main" id="{756EB806-CB63-604A-938E-ACAE7869E120}"/>
-              </a:ext>
-            </a:extLst>
-          </p:cNvPr>
-          <p:cNvPicPr>
-            <a:picLocks noChangeAspect="1"/>
-          </p:cNvPicPr>
-          <p:nvPr/>
-        </p:nvPicPr>
-        <p:blipFill>
-          <a:blip r:embed="rId5"/>
-          <a:stretch>
-            <a:fillRect/>
-          </a:stretch>
-        </p:blipFill>
-        <p:spPr>
-          <a:xfrm>
-            <a:off x="2831195" y="6124217"/>
-            <a:ext cx="1503542" cy="320199"/>
-          </a:xfrm>
-          <a:prstGeom prst="rect">
-            <a:avLst/>
-          </a:prstGeom>
-        </p:spPr>
-      </p:pic>
-      <p:pic>
-        <p:nvPicPr>
-          <p:cNvPr id="18" name="Picture 17" descr="A picture containing object&#10;&#10;Description generated with high confidence">
-            <a:extLst>
-              <a:ext uri="{FF2B5EF4-FFF2-40B4-BE49-F238E27FC236}">
-                <a16:creationId xmlns:a16="http://schemas.microsoft.com/office/drawing/2014/main" id="{F4C6FDD3-921B-CC49-A2EA-04502BF8560F}"/>
+                <a16:creationId xmlns:a16="http://schemas.microsoft.com/office/drawing/2014/main" id="{B672B0B6-4AFF-4F2C-B48D-040710B41026}"/>
               </a:ext>
             </a:extLst>
           </p:cNvPr>
@@ -6058,234 +6232,18 @@
         </p:blipFill>
         <p:spPr>
           <a:xfrm>
-            <a:off x="902147" y="6017617"/>
-            <a:ext cx="1695450" cy="533400"/>
+            <a:off x="8756140" y="1690688"/>
+            <a:ext cx="2447925" cy="2486025"/>
           </a:xfrm>
           <a:prstGeom prst="rect">
             <a:avLst/>
           </a:prstGeom>
         </p:spPr>
       </p:pic>
-      <p:pic>
-        <p:nvPicPr>
-          <p:cNvPr id="19" name="Picture 18">
-            <a:extLst>
-              <a:ext uri="{FF2B5EF4-FFF2-40B4-BE49-F238E27FC236}">
-                <a16:creationId xmlns:a16="http://schemas.microsoft.com/office/drawing/2014/main" id="{FAD3DAE3-4656-5F40-98B8-A1376E12ADE9}"/>
-              </a:ext>
-            </a:extLst>
-          </p:cNvPr>
-          <p:cNvPicPr>
-            <a:picLocks noChangeAspect="1"/>
-          </p:cNvPicPr>
-          <p:nvPr/>
-        </p:nvPicPr>
-        <p:blipFill>
-          <a:blip r:embed="rId7"/>
-          <a:stretch>
-            <a:fillRect/>
-          </a:stretch>
-        </p:blipFill>
-        <p:spPr>
-          <a:xfrm>
-            <a:off x="10034697" y="5823361"/>
-            <a:ext cx="1561062" cy="260177"/>
-          </a:xfrm>
-          <a:prstGeom prst="rect">
-            <a:avLst/>
-          </a:prstGeom>
-        </p:spPr>
-      </p:pic>
-      <p:pic>
-        <p:nvPicPr>
-          <p:cNvPr id="20" name="Picture 19">
-            <a:extLst>
-              <a:ext uri="{FF2B5EF4-FFF2-40B4-BE49-F238E27FC236}">
-                <a16:creationId xmlns:a16="http://schemas.microsoft.com/office/drawing/2014/main" id="{BACE441F-9DB9-764A-A492-331C1B5BFCB5}"/>
-              </a:ext>
-            </a:extLst>
-          </p:cNvPr>
-          <p:cNvPicPr>
-            <a:picLocks noChangeAspect="1"/>
-          </p:cNvPicPr>
-          <p:nvPr/>
-        </p:nvPicPr>
-        <p:blipFill>
-          <a:blip r:embed="rId8"/>
-          <a:stretch>
-            <a:fillRect/>
-          </a:stretch>
-        </p:blipFill>
-        <p:spPr>
-          <a:xfrm>
-            <a:off x="10207651" y="6293093"/>
-            <a:ext cx="1170550" cy="532068"/>
-          </a:xfrm>
-          <a:prstGeom prst="rect">
-            <a:avLst/>
-          </a:prstGeom>
-        </p:spPr>
-      </p:pic>
-      <p:pic>
-        <p:nvPicPr>
-          <p:cNvPr id="21" name="Picture 20">
-            <a:extLst>
-              <a:ext uri="{FF2B5EF4-FFF2-40B4-BE49-F238E27FC236}">
-                <a16:creationId xmlns:a16="http://schemas.microsoft.com/office/drawing/2014/main" id="{55B49D15-9CB9-BD42-8EF1-630F53BE9366}"/>
-              </a:ext>
-            </a:extLst>
-          </p:cNvPr>
-          <p:cNvPicPr>
-            <a:picLocks noChangeAspect="1"/>
-          </p:cNvPicPr>
-          <p:nvPr/>
-        </p:nvPicPr>
-        <p:blipFill>
-          <a:blip r:embed="rId9"/>
-          <a:stretch>
-            <a:fillRect/>
-          </a:stretch>
-        </p:blipFill>
-        <p:spPr>
-          <a:xfrm>
-            <a:off x="10373885" y="6090674"/>
-            <a:ext cx="876567" cy="303427"/>
-          </a:xfrm>
-          <a:prstGeom prst="rect">
-            <a:avLst/>
-          </a:prstGeom>
-        </p:spPr>
-      </p:pic>
-      <p:pic>
-        <p:nvPicPr>
-          <p:cNvPr id="22" name="Picture 21">
-            <a:extLst>
-              <a:ext uri="{FF2B5EF4-FFF2-40B4-BE49-F238E27FC236}">
-                <a16:creationId xmlns:a16="http://schemas.microsoft.com/office/drawing/2014/main" id="{7B468907-D17E-AC49-B2D1-22302FDFB0D5}"/>
-              </a:ext>
-            </a:extLst>
-          </p:cNvPr>
-          <p:cNvPicPr>
-            <a:picLocks noChangeAspect="1"/>
-          </p:cNvPicPr>
-          <p:nvPr/>
-        </p:nvPicPr>
-        <p:blipFill rotWithShape="1">
-          <a:blip r:embed="rId10"/>
-          <a:srcRect l="7592" t="26996" r="7408" b="26271"/>
-          <a:stretch/>
-        </p:blipFill>
-        <p:spPr>
-          <a:xfrm>
-            <a:off x="6079480" y="5970592"/>
-            <a:ext cx="2224576" cy="543589"/>
-          </a:xfrm>
-          <a:prstGeom prst="rect">
-            <a:avLst/>
-          </a:prstGeom>
-        </p:spPr>
-      </p:pic>
-      <p:pic>
-        <p:nvPicPr>
-          <p:cNvPr id="23" name="Picture 22">
-            <a:extLst>
-              <a:ext uri="{FF2B5EF4-FFF2-40B4-BE49-F238E27FC236}">
-                <a16:creationId xmlns:a16="http://schemas.microsoft.com/office/drawing/2014/main" id="{19E5C6F2-B3A5-4D4D-B46C-9C063F2FF9CB}"/>
-              </a:ext>
-            </a:extLst>
-          </p:cNvPr>
-          <p:cNvPicPr>
-            <a:picLocks noChangeAspect="1"/>
-          </p:cNvPicPr>
-          <p:nvPr/>
-        </p:nvPicPr>
-        <p:blipFill rotWithShape="1">
-          <a:blip r:embed="rId11"/>
-          <a:srcRect l="7738" t="19236" r="6803" b="30102"/>
-          <a:stretch/>
-        </p:blipFill>
-        <p:spPr>
-          <a:xfrm>
-            <a:off x="4426194" y="6106723"/>
-            <a:ext cx="1573718" cy="328136"/>
-          </a:xfrm>
-          <a:prstGeom prst="rect">
-            <a:avLst/>
-          </a:prstGeom>
-        </p:spPr>
-      </p:pic>
-      <p:pic>
-        <p:nvPicPr>
-          <p:cNvPr id="24" name="Picture 23">
-            <a:extLst>
-              <a:ext uri="{FF2B5EF4-FFF2-40B4-BE49-F238E27FC236}">
-                <a16:creationId xmlns:a16="http://schemas.microsoft.com/office/drawing/2014/main" id="{AD2EF5E6-8778-2F4E-8E20-F065FA4B9958}"/>
-              </a:ext>
-            </a:extLst>
-          </p:cNvPr>
-          <p:cNvPicPr>
-            <a:picLocks noChangeAspect="1"/>
-          </p:cNvPicPr>
-          <p:nvPr/>
-        </p:nvPicPr>
-        <p:blipFill rotWithShape="1">
-          <a:blip r:embed="rId12"/>
-          <a:srcRect l="9884" t="17682" r="11563" b="19075"/>
-          <a:stretch/>
-        </p:blipFill>
-        <p:spPr>
-          <a:xfrm>
-            <a:off x="8383624" y="6053482"/>
-            <a:ext cx="1458437" cy="442758"/>
-          </a:xfrm>
-          <a:prstGeom prst="rect">
-            <a:avLst/>
-          </a:prstGeom>
-        </p:spPr>
-      </p:pic>
-      <p:sp>
-        <p:nvSpPr>
-          <p:cNvPr id="14" name="TextBox 13">
-            <a:extLst>
-              <a:ext uri="{FF2B5EF4-FFF2-40B4-BE49-F238E27FC236}">
-                <a16:creationId xmlns:a16="http://schemas.microsoft.com/office/drawing/2014/main" id="{8319A7A8-4971-4911-9A92-A48F6108E5B4}"/>
-              </a:ext>
-            </a:extLst>
-          </p:cNvPr>
-          <p:cNvSpPr txBox="1"/>
-          <p:nvPr/>
-        </p:nvSpPr>
-        <p:spPr>
-          <a:xfrm>
-            <a:off x="28576" y="4802924"/>
-            <a:ext cx="7866112" cy="707886"/>
-          </a:xfrm>
-          <a:prstGeom prst="rect">
-            <a:avLst/>
-          </a:prstGeom>
-          <a:noFill/>
-        </p:spPr>
-        <p:txBody>
-          <a:bodyPr wrap="square" rtlCol="0">
-            <a:spAutoFit/>
-          </a:bodyPr>
-          <a:lstStyle/>
-          <a:p>
-            <a:r>
-              <a:rPr lang="en-GB" sz="4000" dirty="0">
-                <a:solidFill>
-                  <a:schemeClr val="bg1"/>
-                </a:solidFill>
-              </a:rPr>
-              <a:t>Module Structure</a:t>
-            </a:r>
-          </a:p>
-        </p:txBody>
-      </p:sp>
     </p:spTree>
     <p:extLst>
       <p:ext uri="{BB962C8B-B14F-4D97-AF65-F5344CB8AC3E}">
-        <p14:creationId xmlns:p14="http://schemas.microsoft.com/office/powerpoint/2010/main" val="552025178"/>
+        <p14:creationId xmlns:p14="http://schemas.microsoft.com/office/powerpoint/2010/main" val="3465153793"/>
       </p:ext>
     </p:extLst>
   </p:cSld>
@@ -6503,7 +6461,7 @@
           <p:cNvPr id="10" name="Title 1">
             <a:extLst>
               <a:ext uri="{FF2B5EF4-FFF2-40B4-BE49-F238E27FC236}">
-                <a16:creationId xmlns:a16="http://schemas.microsoft.com/office/drawing/2014/main" id="{0D5E4B60-CE22-4450-BF21-83243473770F}"/>
+                <a16:creationId xmlns:a16="http://schemas.microsoft.com/office/drawing/2014/main" id="{245345D8-C4EA-46E5-B784-10C9564DFE99}"/>
               </a:ext>
             </a:extLst>
           </p:cNvPr>
@@ -6526,7 +6484,7 @@
           <a:p>
             <a:r>
               <a:rPr lang="en-GB" dirty="0"/>
-              <a:t>Module Structure – Big psm1</a:t>
+              <a:t>Module Structure – Compiled psm1</a:t>
             </a:r>
           </a:p>
         </p:txBody>
@@ -6536,7 +6494,7 @@
           <p:cNvPr id="11" name="Content Placeholder 2">
             <a:extLst>
               <a:ext uri="{FF2B5EF4-FFF2-40B4-BE49-F238E27FC236}">
-                <a16:creationId xmlns:a16="http://schemas.microsoft.com/office/drawing/2014/main" id="{6553DA11-320E-47B4-92C1-597411F32BEE}"/>
+                <a16:creationId xmlns:a16="http://schemas.microsoft.com/office/drawing/2014/main" id="{B4146604-C8EF-46C6-ADA8-599C9DF3F8A4}"/>
               </a:ext>
             </a:extLst>
           </p:cNvPr>
@@ -6566,6 +6524,13 @@
             <a:pPr lvl="1"/>
             <a:r>
               <a:rPr lang="en-GB" dirty="0"/>
+              <a:t>Easy to maintain</a:t>
+            </a:r>
+          </a:p>
+          <a:p>
+            <a:pPr lvl="1"/>
+            <a:r>
+              <a:rPr lang="en-GB" dirty="0"/>
               <a:t>Quick to load</a:t>
             </a:r>
           </a:p>
@@ -6577,6 +6542,13 @@
             </a:r>
           </a:p>
           <a:p>
+            <a:pPr lvl="1"/>
+            <a:r>
+              <a:rPr lang="en-GB" dirty="0"/>
+              <a:t>Easy to add more functions</a:t>
+            </a:r>
+          </a:p>
+          <a:p>
             <a:r>
               <a:rPr lang="en-GB" dirty="0"/>
               <a:t>Cons</a:t>
@@ -6586,14 +6558,14 @@
             <a:pPr lvl="1"/>
             <a:r>
               <a:rPr lang="en-GB" dirty="0"/>
-              <a:t>Difficult to maintain</a:t>
+              <a:t>Extra learning required to use</a:t>
             </a:r>
           </a:p>
           <a:p>
             <a:pPr lvl="1"/>
             <a:r>
               <a:rPr lang="en-GB" dirty="0"/>
-              <a:t>Can become very long</a:t>
+              <a:t>Automation needed</a:t>
             </a:r>
           </a:p>
         </p:txBody>
@@ -6603,7 +6575,7 @@
           <p:cNvPr id="12" name="Picture 11">
             <a:extLst>
               <a:ext uri="{FF2B5EF4-FFF2-40B4-BE49-F238E27FC236}">
-                <a16:creationId xmlns:a16="http://schemas.microsoft.com/office/drawing/2014/main" id="{99BAF1DF-904C-427E-BF9D-01E5EFF050E6}"/>
+                <a16:creationId xmlns:a16="http://schemas.microsoft.com/office/drawing/2014/main" id="{06327583-DEA2-49C2-B94A-E56421DC0FB9}"/>
               </a:ext>
             </a:extLst>
           </p:cNvPr>
@@ -6614,13 +6586,13 @@
         </p:nvPicPr>
         <p:blipFill rotWithShape="1">
           <a:blip r:embed="rId5"/>
-          <a:srcRect t="14199" r="61969"/>
+          <a:srcRect t="17571" r="65863"/>
           <a:stretch/>
         </p:blipFill>
         <p:spPr>
           <a:xfrm>
-            <a:off x="7999563" y="4344658"/>
-            <a:ext cx="4065917" cy="2148217"/>
+            <a:off x="8242647" y="4313208"/>
+            <a:ext cx="3782575" cy="2131292"/>
           </a:xfrm>
           <a:prstGeom prst="rect">
             <a:avLst/>
@@ -6632,7 +6604,7 @@
           <p:cNvPr id="13" name="Picture 12">
             <a:extLst>
               <a:ext uri="{FF2B5EF4-FFF2-40B4-BE49-F238E27FC236}">
-                <a16:creationId xmlns:a16="http://schemas.microsoft.com/office/drawing/2014/main" id="{3A81E3AF-B67D-4FBD-9D0A-29CF7F5C7456}"/>
+                <a16:creationId xmlns:a16="http://schemas.microsoft.com/office/drawing/2014/main" id="{1712C2F2-DDBC-4712-A4FE-4F46D73F50A9}"/>
               </a:ext>
             </a:extLst>
           </p:cNvPr>
@@ -6649,8 +6621,8 @@
         </p:blipFill>
         <p:spPr>
           <a:xfrm>
-            <a:off x="8451515" y="1412889"/>
-            <a:ext cx="2902285" cy="2512255"/>
+            <a:off x="8763000" y="1330296"/>
+            <a:ext cx="2590800" cy="2847975"/>
           </a:xfrm>
           <a:prstGeom prst="rect">
             <a:avLst/>
@@ -6660,7 +6632,7 @@
     </p:spTree>
     <p:extLst>
       <p:ext uri="{BB962C8B-B14F-4D97-AF65-F5344CB8AC3E}">
-        <p14:creationId xmlns:p14="http://schemas.microsoft.com/office/powerpoint/2010/main" val="2784518710"/>
+        <p14:creationId xmlns:p14="http://schemas.microsoft.com/office/powerpoint/2010/main" val="267902903"/>
       </p:ext>
     </p:extLst>
   </p:cSld>
@@ -6689,45 +6661,27 @@
       </p:grpSpPr>
       <p:pic>
         <p:nvPicPr>
-          <p:cNvPr id="6" name="Picture 5"/>
+          <p:cNvPr id="2" name="Picture 1"/>
           <p:cNvPicPr>
             <a:picLocks noChangeAspect="1"/>
           </p:cNvPicPr>
           <p:nvPr/>
         </p:nvPicPr>
-        <p:blipFill>
-          <a:blip r:embed="rId3">
-            <a:clrChange>
-              <a:clrFrom>
-                <a:srgbClr val="FFFFFF"/>
-              </a:clrFrom>
-              <a:clrTo>
-                <a:srgbClr val="FFFFFF">
-                  <a:alpha val="0"/>
-                </a:srgbClr>
-              </a:clrTo>
-            </a:clrChange>
-            <a:duotone>
-              <a:schemeClr val="accent3">
-                <a:shade val="45000"/>
-                <a:satMod val="135000"/>
-              </a:schemeClr>
-              <a:prstClr val="white"/>
-            </a:duotone>
+        <p:blipFill rotWithShape="1">
+          <a:blip r:embed="rId2">
             <a:extLst>
               <a:ext uri="{28A0092B-C50C-407E-A947-70E740481C1C}">
                 <a14:useLocalDpi xmlns:a14="http://schemas.microsoft.com/office/drawing/2010/main" val="0"/>
               </a:ext>
             </a:extLst>
           </a:blip>
-          <a:stretch>
-            <a:fillRect/>
-          </a:stretch>
+          <a:srcRect t="9839" b="19676"/>
+          <a:stretch/>
         </p:blipFill>
         <p:spPr>
           <a:xfrm>
-            <a:off x="0" y="5757143"/>
-            <a:ext cx="1153398" cy="1100857"/>
+            <a:off x="0" y="0"/>
+            <a:ext cx="12192000" cy="5731933"/>
           </a:xfrm>
           <a:prstGeom prst="rect">
             <a:avLst/>
@@ -6736,14 +6690,14 @@
       </p:pic>
       <p:sp>
         <p:nvSpPr>
-          <p:cNvPr id="7" name="Rectangle 6"/>
+          <p:cNvPr id="15" name="Rectangle 14"/>
           <p:cNvSpPr/>
           <p:nvPr/>
         </p:nvSpPr>
         <p:spPr>
           <a:xfrm>
-            <a:off x="986715" y="5999793"/>
-            <a:ext cx="1888814" cy="307777"/>
+            <a:off x="0" y="0"/>
+            <a:ext cx="4419238" cy="584775"/>
           </a:xfrm>
           <a:prstGeom prst="rect">
             <a:avLst/>
@@ -6757,71 +6711,46 @@
           <a:lstStyle/>
           <a:p>
             <a:r>
-              <a:rPr lang="en-US" sz="1400" b="1" dirty="0">
+              <a:rPr lang="en-US" sz="2800" b="1" dirty="0">
                 <a:ln w="10160">
-                  <a:solidFill>
-                    <a:schemeClr val="tx2">
-                      <a:lumMod val="40000"/>
-                      <a:lumOff val="60000"/>
-                    </a:schemeClr>
-                  </a:solidFill>
+                  <a:noFill/>
                   <a:prstDash val="solid"/>
                 </a:ln>
                 <a:solidFill>
-                  <a:schemeClr val="bg1">
-                    <a:lumMod val="75000"/>
-                  </a:schemeClr>
+                  <a:srgbClr val="FFFFFF"/>
                 </a:solidFill>
+                <a:effectLst>
+                  <a:outerShdw blurRad="38100" dist="22860" dir="5400000" algn="tl" rotWithShape="0">
+                    <a:srgbClr val="000000">
+                      <a:alpha val="30000"/>
+                    </a:srgbClr>
+                  </a:outerShdw>
+                </a:effectLst>
                 <a:ea typeface="Kailasa" charset="0"/>
                 <a:cs typeface="Kailasa" charset="0"/>
               </a:rPr>
               <a:t>PowerShell Conference </a:t>
             </a:r>
-          </a:p>
-        </p:txBody>
-      </p:sp>
-      <p:sp>
-        <p:nvSpPr>
-          <p:cNvPr id="8" name="Rectangle 7"/>
-          <p:cNvSpPr/>
-          <p:nvPr/>
-        </p:nvSpPr>
-        <p:spPr>
-          <a:xfrm>
-            <a:off x="1097837" y="6275007"/>
-            <a:ext cx="1888814" cy="307777"/>
-          </a:xfrm>
-          <a:prstGeom prst="rect">
-            <a:avLst/>
-          </a:prstGeom>
-          <a:noFill/>
-        </p:spPr>
-        <p:txBody>
-          <a:bodyPr wrap="square" lIns="91440" tIns="45720" rIns="91440" bIns="45720">
-            <a:spAutoFit/>
-          </a:bodyPr>
-          <a:lstStyle/>
-          <a:p>
-            <a:r>
-              <a:rPr lang="en-US" sz="1400" b="1" dirty="0">
+            <a:r>
+              <a:rPr lang="en-US" sz="3200" b="1" dirty="0">
                 <a:ln w="10160">
-                  <a:solidFill>
-                    <a:schemeClr val="tx2">
-                      <a:lumMod val="40000"/>
-                      <a:lumOff val="60000"/>
-                    </a:schemeClr>
-                  </a:solidFill>
+                  <a:noFill/>
                   <a:prstDash val="solid"/>
                 </a:ln>
                 <a:solidFill>
-                  <a:schemeClr val="bg1">
-                    <a:lumMod val="75000"/>
-                  </a:schemeClr>
+                  <a:srgbClr val="FFFFFF"/>
                 </a:solidFill>
+                <a:effectLst>
+                  <a:outerShdw blurRad="38100" dist="22860" dir="5400000" algn="tl" rotWithShape="0">
+                    <a:srgbClr val="000000">
+                      <a:alpha val="30000"/>
+                    </a:srgbClr>
+                  </a:outerShdw>
+                </a:effectLst>
                 <a:ea typeface="Kailasa" charset="0"/>
                 <a:cs typeface="Kailasa" charset="0"/>
               </a:rPr>
-              <a:t>Singapore 2018</a:t>
+              <a:t>Asia</a:t>
             </a:r>
           </a:p>
         </p:txBody>
@@ -6835,7 +6764,7 @@
           <p:nvPr/>
         </p:nvPicPr>
         <p:blipFill rotWithShape="1">
-          <a:blip r:embed="rId4">
+          <a:blip r:embed="rId3">
             <a:clrChange>
               <a:clrFrom>
                 <a:srgbClr val="FFFFFF"/>
@@ -6865,7 +6794,7 @@
         </p:blipFill>
         <p:spPr>
           <a:xfrm>
-            <a:off x="7109334" y="-139058"/>
+            <a:off x="7075257" y="14288"/>
             <a:ext cx="5088167" cy="5088939"/>
           </a:xfrm>
           <a:prstGeom prst="rect">
@@ -6873,126 +6802,12 @@
           </a:prstGeom>
         </p:spPr>
       </p:pic>
-      <p:sp>
-        <p:nvSpPr>
-          <p:cNvPr id="10" name="Title 1">
-            <a:extLst>
-              <a:ext uri="{FF2B5EF4-FFF2-40B4-BE49-F238E27FC236}">
-                <a16:creationId xmlns:a16="http://schemas.microsoft.com/office/drawing/2014/main" id="{728C0C8E-8AF5-4107-B828-9EF3741D0928}"/>
-              </a:ext>
-            </a:extLst>
-          </p:cNvPr>
-          <p:cNvSpPr>
-            <a:spLocks noGrp="1"/>
-          </p:cNvSpPr>
-          <p:nvPr>
-            <p:ph type="title"/>
-          </p:nvPr>
-        </p:nvSpPr>
-        <p:spPr>
-          <a:xfrm>
-            <a:off x="838200" y="365125"/>
-            <a:ext cx="10515600" cy="1325563"/>
-          </a:xfrm>
-        </p:spPr>
-        <p:txBody>
-          <a:bodyPr/>
-          <a:lstStyle/>
-          <a:p>
-            <a:r>
-              <a:rPr lang="en-GB" dirty="0"/>
-              <a:t>Module Structure – Dot sourced ps1</a:t>
-            </a:r>
-          </a:p>
-        </p:txBody>
-      </p:sp>
-      <p:sp>
-        <p:nvSpPr>
-          <p:cNvPr id="11" name="Content Placeholder 2">
-            <a:extLst>
-              <a:ext uri="{FF2B5EF4-FFF2-40B4-BE49-F238E27FC236}">
-                <a16:creationId xmlns:a16="http://schemas.microsoft.com/office/drawing/2014/main" id="{4B41BCAB-6D98-4821-8A2F-894AC5EDF4AB}"/>
-              </a:ext>
-            </a:extLst>
-          </p:cNvPr>
-          <p:cNvSpPr>
-            <a:spLocks noGrp="1"/>
-          </p:cNvSpPr>
-          <p:nvPr>
-            <p:ph idx="1"/>
-          </p:nvPr>
-        </p:nvSpPr>
-        <p:spPr>
-          <a:xfrm>
-            <a:off x="838200" y="1825625"/>
-            <a:ext cx="10515600" cy="4351338"/>
-          </a:xfrm>
-        </p:spPr>
-        <p:txBody>
-          <a:bodyPr/>
-          <a:lstStyle/>
-          <a:p>
-            <a:r>
-              <a:rPr lang="en-GB" dirty="0"/>
-              <a:t>Pros</a:t>
-            </a:r>
-          </a:p>
-          <a:p>
-            <a:pPr lvl="1"/>
-            <a:r>
-              <a:rPr lang="en-GB" dirty="0"/>
-              <a:t>Easy to maintain</a:t>
-            </a:r>
-          </a:p>
-          <a:p>
-            <a:pPr lvl="1"/>
-            <a:r>
-              <a:rPr lang="en-GB" dirty="0"/>
-              <a:t>Short PSM1</a:t>
-            </a:r>
-          </a:p>
-          <a:p>
-            <a:pPr lvl="1"/>
-            <a:r>
-              <a:rPr lang="en-GB" dirty="0"/>
-              <a:t>Easy to add more functions</a:t>
-            </a:r>
-          </a:p>
-          <a:p>
-            <a:r>
-              <a:rPr lang="en-GB" dirty="0"/>
-              <a:t>Cons</a:t>
-            </a:r>
-          </a:p>
-          <a:p>
-            <a:pPr lvl="1"/>
-            <a:r>
-              <a:rPr lang="en-GB" dirty="0"/>
-              <a:t>Slow to load</a:t>
-            </a:r>
-          </a:p>
-          <a:p>
-            <a:pPr lvl="1"/>
-            <a:r>
-              <a:rPr lang="en-GB" dirty="0"/>
-              <a:t>Potential security issues</a:t>
-            </a:r>
-          </a:p>
-          <a:p>
-            <a:pPr lvl="1"/>
-            <a:r>
-              <a:rPr lang="en-GB" dirty="0"/>
-              <a:t>Slow command discovery</a:t>
-            </a:r>
-          </a:p>
-        </p:txBody>
-      </p:sp>
       <p:pic>
         <p:nvPicPr>
-          <p:cNvPr id="12" name="Picture 11">
+          <p:cNvPr id="16" name="Picture 15">
             <a:extLst>
               <a:ext uri="{FF2B5EF4-FFF2-40B4-BE49-F238E27FC236}">
-                <a16:creationId xmlns:a16="http://schemas.microsoft.com/office/drawing/2014/main" id="{4A5C87EB-C767-44CF-995C-36F91688DFE1}"/>
+                <a16:creationId xmlns:a16="http://schemas.microsoft.com/office/drawing/2014/main" id="{1A0ED2B1-E4E2-A244-9202-508AAD2FB20E}"/>
               </a:ext>
             </a:extLst>
           </p:cNvPr>
@@ -7001,15 +6816,22 @@
           </p:cNvPicPr>
           <p:nvPr/>
         </p:nvPicPr>
-        <p:blipFill rotWithShape="1">
-          <a:blip r:embed="rId5"/>
-          <a:srcRect t="16934" r="62825"/>
-          <a:stretch/>
+        <p:blipFill>
+          <a:blip r:embed="rId4">
+            <a:extLst>
+              <a:ext uri="{28A0092B-C50C-407E-A947-70E740481C1C}">
+                <a14:useLocalDpi xmlns:a14="http://schemas.microsoft.com/office/drawing/2010/main" val="0"/>
+              </a:ext>
+            </a:extLst>
+          </a:blip>
+          <a:stretch>
+            <a:fillRect/>
+          </a:stretch>
         </p:blipFill>
         <p:spPr>
           <a:xfrm>
-            <a:off x="8209472" y="4537104"/>
-            <a:ext cx="3867510" cy="1955771"/>
+            <a:off x="201758" y="5805135"/>
+            <a:ext cx="614818" cy="964420"/>
           </a:xfrm>
           <a:prstGeom prst="rect">
             <a:avLst/>
@@ -7018,10 +6840,40 @@
       </p:pic>
       <p:pic>
         <p:nvPicPr>
-          <p:cNvPr id="13" name="Picture 12">
+          <p:cNvPr id="17" name="Picture 16">
             <a:extLst>
               <a:ext uri="{FF2B5EF4-FFF2-40B4-BE49-F238E27FC236}">
-                <a16:creationId xmlns:a16="http://schemas.microsoft.com/office/drawing/2014/main" id="{B672B0B6-4AFF-4F2C-B48D-040710B41026}"/>
+                <a16:creationId xmlns:a16="http://schemas.microsoft.com/office/drawing/2014/main" id="{42137ABC-3533-2C46-A0C5-78F9821943A6}"/>
+              </a:ext>
+            </a:extLst>
+          </p:cNvPr>
+          <p:cNvPicPr>
+            <a:picLocks noChangeAspect="1"/>
+          </p:cNvPicPr>
+          <p:nvPr/>
+        </p:nvPicPr>
+        <p:blipFill>
+          <a:blip r:embed="rId5"/>
+          <a:stretch>
+            <a:fillRect/>
+          </a:stretch>
+        </p:blipFill>
+        <p:spPr>
+          <a:xfrm>
+            <a:off x="2831195" y="6124217"/>
+            <a:ext cx="1503542" cy="320199"/>
+          </a:xfrm>
+          <a:prstGeom prst="rect">
+            <a:avLst/>
+          </a:prstGeom>
+        </p:spPr>
+      </p:pic>
+      <p:pic>
+        <p:nvPicPr>
+          <p:cNvPr id="18" name="Picture 17" descr="A picture containing object&#10;&#10;Description generated with high confidence">
+            <a:extLst>
+              <a:ext uri="{FF2B5EF4-FFF2-40B4-BE49-F238E27FC236}">
+                <a16:creationId xmlns:a16="http://schemas.microsoft.com/office/drawing/2014/main" id="{0CCBED91-F2B9-9741-AEFF-BD1AA2D06894}"/>
               </a:ext>
             </a:extLst>
           </p:cNvPr>
@@ -7038,18 +6890,234 @@
         </p:blipFill>
         <p:spPr>
           <a:xfrm>
-            <a:off x="8756140" y="1690688"/>
-            <a:ext cx="2447925" cy="2486025"/>
+            <a:off x="902147" y="6017617"/>
+            <a:ext cx="1695450" cy="533400"/>
           </a:xfrm>
           <a:prstGeom prst="rect">
             <a:avLst/>
           </a:prstGeom>
         </p:spPr>
       </p:pic>
+      <p:pic>
+        <p:nvPicPr>
+          <p:cNvPr id="19" name="Picture 18">
+            <a:extLst>
+              <a:ext uri="{FF2B5EF4-FFF2-40B4-BE49-F238E27FC236}">
+                <a16:creationId xmlns:a16="http://schemas.microsoft.com/office/drawing/2014/main" id="{40903A32-6822-554E-BBC4-51410CA1F4D7}"/>
+              </a:ext>
+            </a:extLst>
+          </p:cNvPr>
+          <p:cNvPicPr>
+            <a:picLocks noChangeAspect="1"/>
+          </p:cNvPicPr>
+          <p:nvPr/>
+        </p:nvPicPr>
+        <p:blipFill>
+          <a:blip r:embed="rId7"/>
+          <a:stretch>
+            <a:fillRect/>
+          </a:stretch>
+        </p:blipFill>
+        <p:spPr>
+          <a:xfrm>
+            <a:off x="10034697" y="5823361"/>
+            <a:ext cx="1561062" cy="260177"/>
+          </a:xfrm>
+          <a:prstGeom prst="rect">
+            <a:avLst/>
+          </a:prstGeom>
+        </p:spPr>
+      </p:pic>
+      <p:pic>
+        <p:nvPicPr>
+          <p:cNvPr id="20" name="Picture 19">
+            <a:extLst>
+              <a:ext uri="{FF2B5EF4-FFF2-40B4-BE49-F238E27FC236}">
+                <a16:creationId xmlns:a16="http://schemas.microsoft.com/office/drawing/2014/main" id="{41245FE7-D5C5-E048-BBAC-E3BFCEA85023}"/>
+              </a:ext>
+            </a:extLst>
+          </p:cNvPr>
+          <p:cNvPicPr>
+            <a:picLocks noChangeAspect="1"/>
+          </p:cNvPicPr>
+          <p:nvPr/>
+        </p:nvPicPr>
+        <p:blipFill>
+          <a:blip r:embed="rId8"/>
+          <a:stretch>
+            <a:fillRect/>
+          </a:stretch>
+        </p:blipFill>
+        <p:spPr>
+          <a:xfrm>
+            <a:off x="10207651" y="6293093"/>
+            <a:ext cx="1170550" cy="532068"/>
+          </a:xfrm>
+          <a:prstGeom prst="rect">
+            <a:avLst/>
+          </a:prstGeom>
+        </p:spPr>
+      </p:pic>
+      <p:pic>
+        <p:nvPicPr>
+          <p:cNvPr id="21" name="Picture 20">
+            <a:extLst>
+              <a:ext uri="{FF2B5EF4-FFF2-40B4-BE49-F238E27FC236}">
+                <a16:creationId xmlns:a16="http://schemas.microsoft.com/office/drawing/2014/main" id="{6CA696F8-721E-6845-A92B-EBFF378B7C0A}"/>
+              </a:ext>
+            </a:extLst>
+          </p:cNvPr>
+          <p:cNvPicPr>
+            <a:picLocks noChangeAspect="1"/>
+          </p:cNvPicPr>
+          <p:nvPr/>
+        </p:nvPicPr>
+        <p:blipFill>
+          <a:blip r:embed="rId9"/>
+          <a:stretch>
+            <a:fillRect/>
+          </a:stretch>
+        </p:blipFill>
+        <p:spPr>
+          <a:xfrm>
+            <a:off x="10373885" y="6090674"/>
+            <a:ext cx="876567" cy="303427"/>
+          </a:xfrm>
+          <a:prstGeom prst="rect">
+            <a:avLst/>
+          </a:prstGeom>
+        </p:spPr>
+      </p:pic>
+      <p:pic>
+        <p:nvPicPr>
+          <p:cNvPr id="22" name="Picture 21">
+            <a:extLst>
+              <a:ext uri="{FF2B5EF4-FFF2-40B4-BE49-F238E27FC236}">
+                <a16:creationId xmlns:a16="http://schemas.microsoft.com/office/drawing/2014/main" id="{293D4487-FF7F-614A-A632-E25287029585}"/>
+              </a:ext>
+            </a:extLst>
+          </p:cNvPr>
+          <p:cNvPicPr>
+            <a:picLocks noChangeAspect="1"/>
+          </p:cNvPicPr>
+          <p:nvPr/>
+        </p:nvPicPr>
+        <p:blipFill rotWithShape="1">
+          <a:blip r:embed="rId10"/>
+          <a:srcRect l="7592" t="26996" r="7408" b="26271"/>
+          <a:stretch/>
+        </p:blipFill>
+        <p:spPr>
+          <a:xfrm>
+            <a:off x="6079480" y="5970592"/>
+            <a:ext cx="2224576" cy="543589"/>
+          </a:xfrm>
+          <a:prstGeom prst="rect">
+            <a:avLst/>
+          </a:prstGeom>
+        </p:spPr>
+      </p:pic>
+      <p:pic>
+        <p:nvPicPr>
+          <p:cNvPr id="23" name="Picture 22">
+            <a:extLst>
+              <a:ext uri="{FF2B5EF4-FFF2-40B4-BE49-F238E27FC236}">
+                <a16:creationId xmlns:a16="http://schemas.microsoft.com/office/drawing/2014/main" id="{AD704BE0-A555-3046-B28C-EF9A65321381}"/>
+              </a:ext>
+            </a:extLst>
+          </p:cNvPr>
+          <p:cNvPicPr>
+            <a:picLocks noChangeAspect="1"/>
+          </p:cNvPicPr>
+          <p:nvPr/>
+        </p:nvPicPr>
+        <p:blipFill rotWithShape="1">
+          <a:blip r:embed="rId11"/>
+          <a:srcRect l="7738" t="19236" r="6803" b="30102"/>
+          <a:stretch/>
+        </p:blipFill>
+        <p:spPr>
+          <a:xfrm>
+            <a:off x="4426194" y="6106723"/>
+            <a:ext cx="1573718" cy="328136"/>
+          </a:xfrm>
+          <a:prstGeom prst="rect">
+            <a:avLst/>
+          </a:prstGeom>
+        </p:spPr>
+      </p:pic>
+      <p:pic>
+        <p:nvPicPr>
+          <p:cNvPr id="24" name="Picture 23">
+            <a:extLst>
+              <a:ext uri="{FF2B5EF4-FFF2-40B4-BE49-F238E27FC236}">
+                <a16:creationId xmlns:a16="http://schemas.microsoft.com/office/drawing/2014/main" id="{29181166-D289-1647-A349-FE88F6355342}"/>
+              </a:ext>
+            </a:extLst>
+          </p:cNvPr>
+          <p:cNvPicPr>
+            <a:picLocks noChangeAspect="1"/>
+          </p:cNvPicPr>
+          <p:nvPr/>
+        </p:nvPicPr>
+        <p:blipFill rotWithShape="1">
+          <a:blip r:embed="rId12"/>
+          <a:srcRect l="9884" t="17682" r="11563" b="19075"/>
+          <a:stretch/>
+        </p:blipFill>
+        <p:spPr>
+          <a:xfrm>
+            <a:off x="8383624" y="6053482"/>
+            <a:ext cx="1458437" cy="442758"/>
+          </a:xfrm>
+          <a:prstGeom prst="rect">
+            <a:avLst/>
+          </a:prstGeom>
+        </p:spPr>
+      </p:pic>
+      <p:sp>
+        <p:nvSpPr>
+          <p:cNvPr id="14" name="TextBox 13">
+            <a:extLst>
+              <a:ext uri="{FF2B5EF4-FFF2-40B4-BE49-F238E27FC236}">
+                <a16:creationId xmlns:a16="http://schemas.microsoft.com/office/drawing/2014/main" id="{89117673-F7D0-485D-BC0C-40BCF655D313}"/>
+              </a:ext>
+            </a:extLst>
+          </p:cNvPr>
+          <p:cNvSpPr txBox="1"/>
+          <p:nvPr/>
+        </p:nvSpPr>
+        <p:spPr>
+          <a:xfrm>
+            <a:off x="85192" y="4634000"/>
+            <a:ext cx="7866112" cy="707886"/>
+          </a:xfrm>
+          <a:prstGeom prst="rect">
+            <a:avLst/>
+          </a:prstGeom>
+          <a:noFill/>
+        </p:spPr>
+        <p:txBody>
+          <a:bodyPr wrap="square" rtlCol="0">
+            <a:spAutoFit/>
+          </a:bodyPr>
+          <a:lstStyle/>
+          <a:p>
+            <a:r>
+              <a:rPr lang="en-GB" sz="4000" dirty="0">
+                <a:solidFill>
+                  <a:schemeClr val="bg1"/>
+                </a:solidFill>
+              </a:rPr>
+              <a:t>Folder Structure</a:t>
+            </a:r>
+          </a:p>
+        </p:txBody>
+      </p:sp>
     </p:spTree>
     <p:extLst>
       <p:ext uri="{BB962C8B-B14F-4D97-AF65-F5344CB8AC3E}">
-        <p14:creationId xmlns:p14="http://schemas.microsoft.com/office/powerpoint/2010/main" val="3465153793"/>
+        <p14:creationId xmlns:p14="http://schemas.microsoft.com/office/powerpoint/2010/main" val="1109344342"/>
       </p:ext>
     </p:extLst>
   </p:cSld>
@@ -7267,7 +7335,7 @@
           <p:cNvPr id="10" name="Title 1">
             <a:extLst>
               <a:ext uri="{FF2B5EF4-FFF2-40B4-BE49-F238E27FC236}">
-                <a16:creationId xmlns:a16="http://schemas.microsoft.com/office/drawing/2014/main" id="{245345D8-C4EA-46E5-B784-10C9564DFE99}"/>
+                <a16:creationId xmlns:a16="http://schemas.microsoft.com/office/drawing/2014/main" id="{BD02FBB2-FAAA-4089-B255-BD4C2BA6A407}"/>
               </a:ext>
             </a:extLst>
           </p:cNvPr>
@@ -7290,7 +7358,7 @@
           <a:p>
             <a:r>
               <a:rPr lang="en-GB" dirty="0"/>
-              <a:t>Module Structure – Compiled psm1</a:t>
+              <a:t>Folder Structure</a:t>
             </a:r>
           </a:p>
         </p:txBody>
@@ -7300,7 +7368,7 @@
           <p:cNvPr id="11" name="Content Placeholder 2">
             <a:extLst>
               <a:ext uri="{FF2B5EF4-FFF2-40B4-BE49-F238E27FC236}">
-                <a16:creationId xmlns:a16="http://schemas.microsoft.com/office/drawing/2014/main" id="{B4146604-C8EF-46C6-ADA8-599C9DF3F8A4}"/>
+                <a16:creationId xmlns:a16="http://schemas.microsoft.com/office/drawing/2014/main" id="{C3B00FC6-EED0-4F1D-BAC0-191B71392355}"/>
               </a:ext>
             </a:extLst>
           </p:cNvPr>
@@ -7314,7 +7382,7 @@
         <p:spPr>
           <a:xfrm>
             <a:off x="838200" y="1825625"/>
-            <a:ext cx="10515600" cy="4351338"/>
+            <a:ext cx="8318241" cy="4351338"/>
           </a:xfrm>
         </p:spPr>
         <p:txBody>
@@ -7323,55 +7391,25 @@
           <a:p>
             <a:r>
               <a:rPr lang="en-GB" dirty="0"/>
-              <a:t>Pros</a:t>
-            </a:r>
-          </a:p>
-          <a:p>
-            <a:pPr lvl="1"/>
+              <a:t>Git Ignore file set to ignore the output directory</a:t>
+            </a:r>
+          </a:p>
+          <a:p>
+            <a:endParaRPr lang="en-GB" dirty="0"/>
+          </a:p>
+          <a:p>
             <a:r>
               <a:rPr lang="en-GB" dirty="0"/>
-              <a:t>Easy to maintain</a:t>
-            </a:r>
-          </a:p>
-          <a:p>
-            <a:pPr lvl="1"/>
+              <a:t>VS Code folder to enforce some coding styles and use build script for debugging</a:t>
+            </a:r>
+          </a:p>
+          <a:p>
+            <a:endParaRPr lang="en-GB" dirty="0"/>
+          </a:p>
+          <a:p>
             <a:r>
               <a:rPr lang="en-GB" dirty="0"/>
-              <a:t>Quick to load</a:t>
-            </a:r>
-          </a:p>
-          <a:p>
-            <a:pPr lvl="1"/>
-            <a:r>
-              <a:rPr lang="en-GB" dirty="0"/>
-              <a:t>Easy to distribute</a:t>
-            </a:r>
-          </a:p>
-          <a:p>
-            <a:pPr lvl="1"/>
-            <a:r>
-              <a:rPr lang="en-GB" dirty="0"/>
-              <a:t>Easy to add more functions</a:t>
-            </a:r>
-          </a:p>
-          <a:p>
-            <a:r>
-              <a:rPr lang="en-GB" dirty="0"/>
-              <a:t>Cons</a:t>
-            </a:r>
-          </a:p>
-          <a:p>
-            <a:pPr lvl="1"/>
-            <a:r>
-              <a:rPr lang="en-GB" dirty="0"/>
-              <a:t>Extra learning required to use</a:t>
-            </a:r>
-          </a:p>
-          <a:p>
-            <a:pPr lvl="1"/>
-            <a:r>
-              <a:rPr lang="en-GB" dirty="0"/>
-              <a:t>Automation needed</a:t>
+              <a:t>Source split into public and private folders with 1 function per ps1 file.</a:t>
             </a:r>
           </a:p>
         </p:txBody>
@@ -7381,7 +7419,7 @@
           <p:cNvPr id="12" name="Picture 11">
             <a:extLst>
               <a:ext uri="{FF2B5EF4-FFF2-40B4-BE49-F238E27FC236}">
-                <a16:creationId xmlns:a16="http://schemas.microsoft.com/office/drawing/2014/main" id="{06327583-DEA2-49C2-B94A-E56421DC0FB9}"/>
+                <a16:creationId xmlns:a16="http://schemas.microsoft.com/office/drawing/2014/main" id="{1E938204-30CD-4E29-9434-F7C4336272E1}"/>
               </a:ext>
             </a:extLst>
           </p:cNvPr>
@@ -7390,45 +7428,16 @@
           </p:cNvPicPr>
           <p:nvPr/>
         </p:nvPicPr>
-        <p:blipFill rotWithShape="1">
+        <p:blipFill>
           <a:blip r:embed="rId5"/>
-          <a:srcRect t="17571" r="65863"/>
-          <a:stretch/>
-        </p:blipFill>
-        <p:spPr>
-          <a:xfrm>
-            <a:off x="8242647" y="4313208"/>
-            <a:ext cx="3782575" cy="2131292"/>
-          </a:xfrm>
-          <a:prstGeom prst="rect">
-            <a:avLst/>
-          </a:prstGeom>
-        </p:spPr>
-      </p:pic>
-      <p:pic>
-        <p:nvPicPr>
-          <p:cNvPr id="13" name="Picture 12">
-            <a:extLst>
-              <a:ext uri="{FF2B5EF4-FFF2-40B4-BE49-F238E27FC236}">
-                <a16:creationId xmlns:a16="http://schemas.microsoft.com/office/drawing/2014/main" id="{1712C2F2-DDBC-4712-A4FE-4F46D73F50A9}"/>
-              </a:ext>
-            </a:extLst>
-          </p:cNvPr>
-          <p:cNvPicPr>
-            <a:picLocks noChangeAspect="1"/>
-          </p:cNvPicPr>
-          <p:nvPr/>
-        </p:nvPicPr>
-        <p:blipFill>
-          <a:blip r:embed="rId6"/>
           <a:stretch>
             <a:fillRect/>
           </a:stretch>
         </p:blipFill>
         <p:spPr>
           <a:xfrm>
-            <a:off x="8763000" y="1330296"/>
-            <a:ext cx="2590800" cy="2847975"/>
+            <a:off x="9337799" y="832595"/>
+            <a:ext cx="2559606" cy="5192810"/>
           </a:xfrm>
           <a:prstGeom prst="rect">
             <a:avLst/>
@@ -7438,7 +7447,7 @@
     </p:spTree>
     <p:extLst>
       <p:ext uri="{BB962C8B-B14F-4D97-AF65-F5344CB8AC3E}">
-        <p14:creationId xmlns:p14="http://schemas.microsoft.com/office/powerpoint/2010/main" val="267902903"/>
+        <p14:creationId xmlns:p14="http://schemas.microsoft.com/office/powerpoint/2010/main" val="4108849427"/>
       </p:ext>
     </p:extLst>
   </p:cSld>
@@ -8978,7 +8987,7 @@
           <a:p>
             <a:r>
               <a:rPr lang="en-GB" dirty="0"/>
-              <a:t>Azure DevOps, </a:t>
+              <a:t>Azure Pipelines, </a:t>
             </a:r>
             <a:r>
               <a:rPr lang="en-GB" dirty="0" err="1"/>
@@ -11717,7 +11726,7 @@
             </a:pPr>
             <a:r>
               <a:rPr lang="en-GB" sz="3200" dirty="0"/>
-              <a:t>Folder Structure</a:t>
+              <a:t>Module Structure options</a:t>
             </a:r>
           </a:p>
           <a:p>
@@ -11727,7 +11736,7 @@
             </a:pPr>
             <a:r>
               <a:rPr lang="en-GB" sz="3200" dirty="0"/>
-              <a:t>Module Structure options</a:t>
+              <a:t>Folder Structure</a:t>
             </a:r>
           </a:p>
           <a:p>
@@ -14290,7 +14299,7 @@
       </p:grpSpPr>
       <p:pic>
         <p:nvPicPr>
-          <p:cNvPr id="2" name="Picture 1"/>
+          <p:cNvPr id="4" name="Picture 3"/>
           <p:cNvPicPr>
             <a:picLocks noChangeAspect="1"/>
           </p:cNvPicPr>
@@ -14304,13 +14313,13 @@
               </a:ext>
             </a:extLst>
           </a:blip>
-          <a:srcRect t="9839" b="19676"/>
+          <a:srcRect t="3338" b="26176"/>
           <a:stretch/>
         </p:blipFill>
         <p:spPr>
           <a:xfrm>
-            <a:off x="0" y="0"/>
-            <a:ext cx="12192000" cy="5731933"/>
+            <a:off x="-1" y="-1"/>
+            <a:ext cx="12192001" cy="5731934"/>
           </a:xfrm>
           <a:prstGeom prst="rect">
             <a:avLst/>
@@ -14436,7 +14445,7 @@
           <p:cNvPr id="16" name="Picture 15">
             <a:extLst>
               <a:ext uri="{FF2B5EF4-FFF2-40B4-BE49-F238E27FC236}">
-                <a16:creationId xmlns:a16="http://schemas.microsoft.com/office/drawing/2014/main" id="{1A0ED2B1-E4E2-A244-9202-508AAD2FB20E}"/>
+                <a16:creationId xmlns:a16="http://schemas.microsoft.com/office/drawing/2014/main" id="{B6DA533B-3B86-714A-9875-96A55A5B60C1}"/>
               </a:ext>
             </a:extLst>
           </p:cNvPr>
@@ -14472,7 +14481,7 @@
           <p:cNvPr id="17" name="Picture 16">
             <a:extLst>
               <a:ext uri="{FF2B5EF4-FFF2-40B4-BE49-F238E27FC236}">
-                <a16:creationId xmlns:a16="http://schemas.microsoft.com/office/drawing/2014/main" id="{42137ABC-3533-2C46-A0C5-78F9821943A6}"/>
+                <a16:creationId xmlns:a16="http://schemas.microsoft.com/office/drawing/2014/main" id="{756EB806-CB63-604A-938E-ACAE7869E120}"/>
               </a:ext>
             </a:extLst>
           </p:cNvPr>
@@ -14502,7 +14511,7 @@
           <p:cNvPr id="18" name="Picture 17" descr="A picture containing object&#10;&#10;Description generated with high confidence">
             <a:extLst>
               <a:ext uri="{FF2B5EF4-FFF2-40B4-BE49-F238E27FC236}">
-                <a16:creationId xmlns:a16="http://schemas.microsoft.com/office/drawing/2014/main" id="{0CCBED91-F2B9-9741-AEFF-BD1AA2D06894}"/>
+                <a16:creationId xmlns:a16="http://schemas.microsoft.com/office/drawing/2014/main" id="{F4C6FDD3-921B-CC49-A2EA-04502BF8560F}"/>
               </a:ext>
             </a:extLst>
           </p:cNvPr>
@@ -14532,7 +14541,7 @@
           <p:cNvPr id="19" name="Picture 18">
             <a:extLst>
               <a:ext uri="{FF2B5EF4-FFF2-40B4-BE49-F238E27FC236}">
-                <a16:creationId xmlns:a16="http://schemas.microsoft.com/office/drawing/2014/main" id="{40903A32-6822-554E-BBC4-51410CA1F4D7}"/>
+                <a16:creationId xmlns:a16="http://schemas.microsoft.com/office/drawing/2014/main" id="{FAD3DAE3-4656-5F40-98B8-A1376E12ADE9}"/>
               </a:ext>
             </a:extLst>
           </p:cNvPr>
@@ -14562,7 +14571,7 @@
           <p:cNvPr id="20" name="Picture 19">
             <a:extLst>
               <a:ext uri="{FF2B5EF4-FFF2-40B4-BE49-F238E27FC236}">
-                <a16:creationId xmlns:a16="http://schemas.microsoft.com/office/drawing/2014/main" id="{41245FE7-D5C5-E048-BBAC-E3BFCEA85023}"/>
+                <a16:creationId xmlns:a16="http://schemas.microsoft.com/office/drawing/2014/main" id="{BACE441F-9DB9-764A-A492-331C1B5BFCB5}"/>
               </a:ext>
             </a:extLst>
           </p:cNvPr>
@@ -14592,7 +14601,7 @@
           <p:cNvPr id="21" name="Picture 20">
             <a:extLst>
               <a:ext uri="{FF2B5EF4-FFF2-40B4-BE49-F238E27FC236}">
-                <a16:creationId xmlns:a16="http://schemas.microsoft.com/office/drawing/2014/main" id="{6CA696F8-721E-6845-A92B-EBFF378B7C0A}"/>
+                <a16:creationId xmlns:a16="http://schemas.microsoft.com/office/drawing/2014/main" id="{55B49D15-9CB9-BD42-8EF1-630F53BE9366}"/>
               </a:ext>
             </a:extLst>
           </p:cNvPr>
@@ -14622,7 +14631,7 @@
           <p:cNvPr id="22" name="Picture 21">
             <a:extLst>
               <a:ext uri="{FF2B5EF4-FFF2-40B4-BE49-F238E27FC236}">
-                <a16:creationId xmlns:a16="http://schemas.microsoft.com/office/drawing/2014/main" id="{293D4487-FF7F-614A-A632-E25287029585}"/>
+                <a16:creationId xmlns:a16="http://schemas.microsoft.com/office/drawing/2014/main" id="{7B468907-D17E-AC49-B2D1-22302FDFB0D5}"/>
               </a:ext>
             </a:extLst>
           </p:cNvPr>
@@ -14651,7 +14660,7 @@
           <p:cNvPr id="23" name="Picture 22">
             <a:extLst>
               <a:ext uri="{FF2B5EF4-FFF2-40B4-BE49-F238E27FC236}">
-                <a16:creationId xmlns:a16="http://schemas.microsoft.com/office/drawing/2014/main" id="{AD704BE0-A555-3046-B28C-EF9A65321381}"/>
+                <a16:creationId xmlns:a16="http://schemas.microsoft.com/office/drawing/2014/main" id="{19E5C6F2-B3A5-4D4D-B46C-9C063F2FF9CB}"/>
               </a:ext>
             </a:extLst>
           </p:cNvPr>
@@ -14680,7 +14689,7 @@
           <p:cNvPr id="24" name="Picture 23">
             <a:extLst>
               <a:ext uri="{FF2B5EF4-FFF2-40B4-BE49-F238E27FC236}">
-                <a16:creationId xmlns:a16="http://schemas.microsoft.com/office/drawing/2014/main" id="{29181166-D289-1647-A349-FE88F6355342}"/>
+                <a16:creationId xmlns:a16="http://schemas.microsoft.com/office/drawing/2014/main" id="{AD2EF5E6-8778-2F4E-8E20-F065FA4B9958}"/>
               </a:ext>
             </a:extLst>
           </p:cNvPr>
@@ -14709,7 +14718,7 @@
           <p:cNvPr id="14" name="TextBox 13">
             <a:extLst>
               <a:ext uri="{FF2B5EF4-FFF2-40B4-BE49-F238E27FC236}">
-                <a16:creationId xmlns:a16="http://schemas.microsoft.com/office/drawing/2014/main" id="{89117673-F7D0-485D-BC0C-40BCF655D313}"/>
+                <a16:creationId xmlns:a16="http://schemas.microsoft.com/office/drawing/2014/main" id="{8319A7A8-4971-4911-9A92-A48F6108E5B4}"/>
               </a:ext>
             </a:extLst>
           </p:cNvPr>
@@ -14718,7 +14727,7 @@
         </p:nvSpPr>
         <p:spPr>
           <a:xfrm>
-            <a:off x="85192" y="4634000"/>
+            <a:off x="28576" y="4802924"/>
             <a:ext cx="7866112" cy="707886"/>
           </a:xfrm>
           <a:prstGeom prst="rect">
@@ -14738,7 +14747,7 @@
                   <a:schemeClr val="bg1"/>
                 </a:solidFill>
               </a:rPr>
-              <a:t>Folder Structure</a:t>
+              <a:t>Module Structure</a:t>
             </a:r>
           </a:p>
         </p:txBody>
@@ -14746,7 +14755,7 @@
     </p:spTree>
     <p:extLst>
       <p:ext uri="{BB962C8B-B14F-4D97-AF65-F5344CB8AC3E}">
-        <p14:creationId xmlns:p14="http://schemas.microsoft.com/office/powerpoint/2010/main" val="1109344342"/>
+        <p14:creationId xmlns:p14="http://schemas.microsoft.com/office/powerpoint/2010/main" val="552025178"/>
       </p:ext>
     </p:extLst>
   </p:cSld>
@@ -15279,6 +15288,21 @@
 </file>
 
 <file path=customXml/item1.xml><?xml version="1.0" encoding="utf-8"?>
+<?mso-contentType ?>
+<FormTemplates xmlns="http://schemas.microsoft.com/sharepoint/v3/contenttype/forms">
+  <Display>DocumentLibraryForm</Display>
+  <Edit>DocumentLibraryForm</Edit>
+  <New>DocumentLibraryForm</New>
+</FormTemplates>
+</file>
+
+<file path=customXml/item2.xml><?xml version="1.0" encoding="utf-8"?>
+<p:properties xmlns:p="http://schemas.microsoft.com/office/2006/metadata/properties" xmlns:xsi="http://www.w3.org/2001/XMLSchema-instance" xmlns:pc="http://schemas.microsoft.com/office/infopath/2007/PartnerControls">
+  <documentManagement/>
+</p:properties>
+</file>
+
+<file path=customXml/item3.xml><?xml version="1.0" encoding="utf-8"?>
 <ct:contentTypeSchema xmlns:ct="http://schemas.microsoft.com/office/2006/metadata/contentType" xmlns:ma="http://schemas.microsoft.com/office/2006/metadata/properties/metaAttributes" ct:_="" ma:_="" ma:contentTypeName="Document" ma:contentTypeID="0x0101000870A200AD61034F824A14E42296AF19" ma:contentTypeVersion="3" ma:contentTypeDescription="Create a new document." ma:contentTypeScope="" ma:versionID="73aacb02c6f81c6cd1259496118e75e6">
   <xsd:schema xmlns:xsd="http://www.w3.org/2001/XMLSchema" xmlns:xs="http://www.w3.org/2001/XMLSchema" xmlns:p="http://schemas.microsoft.com/office/2006/metadata/properties" xmlns:ns2="35430ae4-e281-43de-938c-38a1ecae3204" targetNamespace="http://schemas.microsoft.com/office/2006/metadata/properties" ma:root="true" ma:fieldsID="27565c2e1105912c3783aec573fd6480" ns2:_="">
     <xsd:import namespace="35430ae4-e281-43de-938c-38a1ecae3204"/>
@@ -15416,35 +15440,10 @@
 </ct:contentTypeSchema>
 </file>
 
-<file path=customXml/item2.xml><?xml version="1.0" encoding="utf-8"?>
-<p:properties xmlns:p="http://schemas.microsoft.com/office/2006/metadata/properties" xmlns:xsi="http://www.w3.org/2001/XMLSchema-instance" xmlns:pc="http://schemas.microsoft.com/office/infopath/2007/PartnerControls">
-  <documentManagement/>
-</p:properties>
-</file>
-
-<file path=customXml/item3.xml><?xml version="1.0" encoding="utf-8"?>
-<?mso-contentType ?>
-<FormTemplates xmlns="http://schemas.microsoft.com/sharepoint/v3/contenttype/forms">
-  <Display>DocumentLibraryForm</Display>
-  <Edit>DocumentLibraryForm</Edit>
-  <New>DocumentLibraryForm</New>
-</FormTemplates>
-</file>
-
 <file path=customXml/itemProps1.xml><?xml version="1.0" encoding="utf-8"?>
-<ds:datastoreItem xmlns:ds="http://schemas.openxmlformats.org/officeDocument/2006/customXml" ds:itemID="{CBC1BA2F-C324-4101-A7BA-03699E0CB169}">
+<ds:datastoreItem xmlns:ds="http://schemas.openxmlformats.org/officeDocument/2006/customXml" ds:itemID="{72756391-D205-424A-B5B1-7032AF382F33}">
   <ds:schemaRefs>
-    <ds:schemaRef ds:uri="http://schemas.microsoft.com/office/2006/metadata/contentType"/>
-    <ds:schemaRef ds:uri="http://schemas.microsoft.com/office/2006/metadata/properties/metaAttributes"/>
-    <ds:schemaRef ds:uri="http://www.w3.org/2001/XMLSchema"/>
-    <ds:schemaRef ds:uri="http://schemas.microsoft.com/office/2006/metadata/properties"/>
-    <ds:schemaRef ds:uri="35430ae4-e281-43de-938c-38a1ecae3204"/>
-    <ds:schemaRef ds:uri="http://schemas.microsoft.com/office/2006/documentManagement/types"/>
-    <ds:schemaRef ds:uri="http://schemas.microsoft.com/office/infopath/2007/PartnerControls"/>
-    <ds:schemaRef ds:uri="http://schemas.openxmlformats.org/package/2006/metadata/core-properties"/>
-    <ds:schemaRef ds:uri="http://purl.org/dc/elements/1.1/"/>
-    <ds:schemaRef ds:uri="http://purl.org/dc/terms/"/>
-    <ds:schemaRef ds:uri="http://schemas.microsoft.com/internal/obd"/>
+    <ds:schemaRef ds:uri="http://schemas.microsoft.com/sharepoint/v3/contenttype/forms"/>
   </ds:schemaRefs>
 </ds:datastoreItem>
 </file>
@@ -15466,9 +15465,19 @@
 </file>
 
 <file path=customXml/itemProps3.xml><?xml version="1.0" encoding="utf-8"?>
-<ds:datastoreItem xmlns:ds="http://schemas.openxmlformats.org/officeDocument/2006/customXml" ds:itemID="{72756391-D205-424A-B5B1-7032AF382F33}">
+<ds:datastoreItem xmlns:ds="http://schemas.openxmlformats.org/officeDocument/2006/customXml" ds:itemID="{CBC1BA2F-C324-4101-A7BA-03699E0CB169}">
   <ds:schemaRefs>
-    <ds:schemaRef ds:uri="http://schemas.microsoft.com/sharepoint/v3/contenttype/forms"/>
+    <ds:schemaRef ds:uri="http://schemas.microsoft.com/office/2006/metadata/contentType"/>
+    <ds:schemaRef ds:uri="http://schemas.microsoft.com/office/2006/metadata/properties/metaAttributes"/>
+    <ds:schemaRef ds:uri="http://www.w3.org/2001/XMLSchema"/>
+    <ds:schemaRef ds:uri="http://schemas.microsoft.com/office/2006/metadata/properties"/>
+    <ds:schemaRef ds:uri="35430ae4-e281-43de-938c-38a1ecae3204"/>
+    <ds:schemaRef ds:uri="http://schemas.microsoft.com/office/2006/documentManagement/types"/>
+    <ds:schemaRef ds:uri="http://schemas.microsoft.com/office/infopath/2007/PartnerControls"/>
+    <ds:schemaRef ds:uri="http://schemas.openxmlformats.org/package/2006/metadata/core-properties"/>
+    <ds:schemaRef ds:uri="http://purl.org/dc/elements/1.1/"/>
+    <ds:schemaRef ds:uri="http://purl.org/dc/terms/"/>
+    <ds:schemaRef ds:uri="http://schemas.microsoft.com/internal/obd"/>
   </ds:schemaRefs>
 </ds:datastoreItem>
 </file>
</xml_diff>